<commit_message>
Updates for CzechDreamin' 19.
</commit_message>
<xml_diff>
--- a/Tahoe Dreamin Platform Cache.pptx
+++ b/Tahoe Dreamin Platform Cache.pptx
@@ -637,39 +637,39 @@
               <a:buNone/>
             </a:pPr>
             <a:r>
-              <a:rPr lang="de-DE" smtClean="0"/>
+              <a:rPr lang="de-DE"/>
               <a:t>Just</a:t>
             </a:r>
             <a:r>
-              <a:rPr lang="de-DE" baseline="0" smtClean="0"/>
+              <a:rPr lang="de-DE" baseline="0"/>
               <a:t> </a:t>
             </a:r>
             <a:r>
-              <a:rPr lang="de-DE" baseline="0" err="1" smtClean="0"/>
+              <a:rPr lang="de-DE" baseline="0" err="1"/>
               <a:t>short</a:t>
             </a:r>
             <a:r>
-              <a:rPr lang="de-DE" baseline="0" smtClean="0"/>
+              <a:rPr lang="de-DE" baseline="0"/>
               <a:t> </a:t>
             </a:r>
             <a:r>
-              <a:rPr lang="de-DE" baseline="0" err="1" smtClean="0"/>
+              <a:rPr lang="de-DE" baseline="0" err="1"/>
               <a:t>intro</a:t>
             </a:r>
             <a:r>
-              <a:rPr lang="de-DE" baseline="0" smtClean="0"/>
+              <a:rPr lang="de-DE" baseline="0"/>
               <a:t>! </a:t>
             </a:r>
             <a:r>
-              <a:rPr lang="de-DE" baseline="0" err="1" smtClean="0"/>
+              <a:rPr lang="de-DE" baseline="0" err="1"/>
               <a:t>Nothing</a:t>
             </a:r>
             <a:r>
-              <a:rPr lang="de-DE" baseline="0" smtClean="0"/>
+              <a:rPr lang="de-DE" baseline="0"/>
               <a:t> </a:t>
             </a:r>
             <a:r>
-              <a:rPr lang="de-DE" baseline="0" err="1" smtClean="0"/>
+              <a:rPr lang="de-DE" baseline="0" err="1"/>
               <a:t>ellse</a:t>
             </a:r>
             <a:endParaRPr/>
@@ -2975,27 +2975,27 @@
               <a:buNone/>
             </a:pPr>
             <a:r>
-              <a:rPr lang="de-DE" dirty="0" err="1" smtClean="0"/>
+              <a:rPr lang="de-DE" dirty="0" err="1"/>
               <a:t>What</a:t>
             </a:r>
             <a:r>
-              <a:rPr lang="de-DE" baseline="0" dirty="0" smtClean="0"/>
+              <a:rPr lang="de-DE" baseline="0" dirty="0"/>
               <a:t> </a:t>
             </a:r>
             <a:r>
-              <a:rPr lang="de-DE" baseline="0" dirty="0" err="1" smtClean="0"/>
+              <a:rPr lang="de-DE" baseline="0" dirty="0" err="1"/>
               <a:t>to</a:t>
             </a:r>
             <a:r>
-              <a:rPr lang="de-DE" baseline="0" dirty="0" smtClean="0"/>
+              <a:rPr lang="de-DE" baseline="0" dirty="0"/>
               <a:t> </a:t>
             </a:r>
             <a:r>
-              <a:rPr lang="de-DE" baseline="0" dirty="0" err="1" smtClean="0"/>
+              <a:rPr lang="de-DE" baseline="0" dirty="0" err="1"/>
               <a:t>expect</a:t>
             </a:r>
             <a:r>
-              <a:rPr lang="de-DE" baseline="0" dirty="0" smtClean="0"/>
+              <a:rPr lang="de-DE" baseline="0" dirty="0"/>
               <a:t>?</a:t>
             </a:r>
           </a:p>
@@ -3007,30 +3007,30 @@
               <a:buNone/>
             </a:pPr>
             <a:r>
-              <a:rPr lang="de-DE" baseline="0" dirty="0" smtClean="0"/>
+              <a:rPr lang="de-DE" baseline="0" dirty="0"/>
               <a:t>Intermediate Level </a:t>
             </a:r>
             <a:r>
-              <a:rPr lang="de-DE" baseline="0" dirty="0" err="1" smtClean="0"/>
+              <a:rPr lang="de-DE" baseline="0" dirty="0" err="1"/>
               <a:t>Coding</a:t>
             </a:r>
             <a:r>
-              <a:rPr lang="de-DE" baseline="0" dirty="0" smtClean="0"/>
+              <a:rPr lang="de-DE" baseline="0" dirty="0"/>
               <a:t> </a:t>
             </a:r>
             <a:r>
-              <a:rPr lang="de-DE" baseline="0" dirty="0" err="1" smtClean="0"/>
+              <a:rPr lang="de-DE" baseline="0" dirty="0" err="1"/>
               <a:t>Sklills</a:t>
             </a:r>
             <a:r>
-              <a:rPr lang="de-DE" baseline="0" dirty="0" smtClean="0"/>
+              <a:rPr lang="de-DE" baseline="0" dirty="0"/>
               <a:t>, Apex </a:t>
             </a:r>
             <a:r>
-              <a:rPr lang="de-DE" baseline="0" dirty="0" err="1" smtClean="0"/>
+              <a:rPr lang="de-DE" baseline="0" dirty="0" err="1"/>
               <a:t>Devs</a:t>
             </a:r>
-            <a:endParaRPr lang="de-DE" baseline="0" dirty="0" smtClean="0"/>
+            <a:endParaRPr lang="de-DE" baseline="0" dirty="0"/>
           </a:p>
           <a:p>
             <a:pPr lvl="0">
@@ -18747,7 +18747,7 @@
               <a:t>Making </a:t>
             </a:r>
             <a:r>
-              <a:rPr lang="de-DE" sz="3600" dirty="0" err="1" smtClean="0"/>
+              <a:rPr lang="de-DE" sz="3600" dirty="0" err="1"/>
               <a:t>Friends</a:t>
             </a:r>
             <a:r>
@@ -18755,12 +18755,8 @@
               <a:t> </a:t>
             </a:r>
             <a:r>
-              <a:rPr lang="de-DE" sz="3600" err="1" smtClean="0"/>
+              <a:rPr lang="de-DE" sz="3600" err="1"/>
               <a:t>With</a:t>
-            </a:r>
-            <a:r>
-              <a:rPr lang="de-DE"/>
-              <a:t/>
             </a:r>
             <a:br>
               <a:rPr lang="de-DE"/>
@@ -18785,13 +18781,6 @@
   <p:clrMapOvr>
     <a:masterClrMapping/>
   </p:clrMapOvr>
-  <p:timing>
-    <p:tnLst>
-      <p:par>
-        <p:cTn id="1" dur="indefinite" restart="never" nodeType="tmRoot"/>
-      </p:par>
-    </p:tnLst>
-  </p:timing>
 </p:sld>
 </file>
 
@@ -19846,7 +19835,7 @@
               <a:buNone/>
             </a:pPr>
             <a:r>
-              <a:rPr lang="de-DE" b="1" smtClean="0">
+              <a:rPr lang="de-DE" b="1">
                 <a:solidFill>
                   <a:srgbClr val="19BBD5"/>
                 </a:solidFill>
@@ -19854,14 +19843,14 @@
               <a:t>Developer </a:t>
             </a:r>
             <a:r>
-              <a:rPr lang="de-DE" b="1" err="1" smtClean="0">
+              <a:rPr lang="de-DE" b="1" err="1">
                 <a:solidFill>
                   <a:srgbClr val="19BBD5"/>
                 </a:solidFill>
               </a:rPr>
               <a:t>Workbench</a:t>
             </a:r>
-            <a:endParaRPr lang="de-DE" b="1" smtClean="0">
+            <a:endParaRPr lang="de-DE" b="1">
               <a:solidFill>
                 <a:srgbClr val="19BBD5"/>
               </a:solidFill>
@@ -19876,31 +19865,31 @@
               <a:buNone/>
             </a:pPr>
             <a:r>
-              <a:rPr lang="de-DE" sz="1800" err="1" smtClean="0"/>
+              <a:rPr lang="de-DE" sz="1800" err="1"/>
               <a:t>Retrieve</a:t>
             </a:r>
             <a:r>
-              <a:rPr lang="de-DE" sz="1800" smtClean="0"/>
+              <a:rPr lang="de-DE" sz="1800"/>
               <a:t> </a:t>
             </a:r>
             <a:r>
-              <a:rPr lang="de-DE" sz="1800" err="1" smtClean="0"/>
+              <a:rPr lang="de-DE" sz="1800" err="1"/>
               <a:t>your</a:t>
             </a:r>
             <a:r>
-              <a:rPr lang="de-DE" sz="1800" smtClean="0"/>
+              <a:rPr lang="de-DE" sz="1800"/>
               <a:t> </a:t>
             </a:r>
             <a:r>
-              <a:rPr lang="de-DE" sz="1800" err="1" smtClean="0"/>
+              <a:rPr lang="de-DE" sz="1800" err="1"/>
               <a:t>first</a:t>
             </a:r>
             <a:r>
-              <a:rPr lang="de-DE" sz="1800" smtClean="0"/>
+              <a:rPr lang="de-DE" sz="1800"/>
               <a:t> </a:t>
             </a:r>
             <a:r>
-              <a:rPr lang="de-DE" sz="1800" err="1" smtClean="0"/>
+              <a:rPr lang="de-DE" sz="1800" err="1"/>
               <a:t>value</a:t>
             </a:r>
             <a:endParaRPr lang="en" sz="1800"/>
@@ -19946,13 +19935,6 @@
   <p:clrMapOvr>
     <a:masterClrMapping/>
   </p:clrMapOvr>
-  <p:timing>
-    <p:tnLst>
-      <p:par>
-        <p:cTn id="1" dur="indefinite" restart="never" nodeType="tmRoot"/>
-      </p:par>
-    </p:tnLst>
-  </p:timing>
 </p:sld>
 </file>
 
@@ -20005,11 +19987,11 @@
               <a:buNone/>
             </a:pPr>
             <a:r>
-              <a:rPr lang="de-DE" smtClean="0"/>
+              <a:rPr lang="de-DE"/>
               <a:t>First </a:t>
             </a:r>
             <a:r>
-              <a:rPr lang="de-DE" err="1" smtClean="0"/>
+              <a:rPr lang="de-DE" err="1"/>
               <a:t>Impressions</a:t>
             </a:r>
             <a:endParaRPr lang="en"/>
@@ -20050,7 +20032,7 @@
               </a:spcBef>
             </a:pPr>
             <a:r>
-              <a:rPr lang="en-US" smtClean="0"/>
+              <a:rPr lang="en-US"/>
               <a:t>It works really smooth</a:t>
             </a:r>
           </a:p>
@@ -20064,7 +20046,7 @@
               </a:spcBef>
             </a:pPr>
             <a:r>
-              <a:rPr lang="en-US" smtClean="0"/>
+              <a:rPr lang="en-US"/>
               <a:t>It‘s like interacting with a map of Objects by calling put() and get() methods on it</a:t>
             </a:r>
           </a:p>
@@ -20078,7 +20060,7 @@
               </a:spcBef>
             </a:pPr>
             <a:r>
-              <a:rPr lang="en-US" smtClean="0"/>
+              <a:rPr lang="en-US"/>
               <a:t>... and it‘s super fast (compared to using SOQL to build maps)</a:t>
             </a:r>
           </a:p>
@@ -20091,7 +20073,7 @@
                 <a:spcPts val="0"/>
               </a:spcBef>
             </a:pPr>
-            <a:endParaRPr lang="de-DE" smtClean="0"/>
+            <a:endParaRPr lang="de-DE"/>
           </a:p>
         </p:txBody>
       </p:sp>
@@ -20105,13 +20087,6 @@
   <p:clrMapOvr>
     <a:masterClrMapping/>
   </p:clrMapOvr>
-  <p:timing>
-    <p:tnLst>
-      <p:par>
-        <p:cTn id="1" dur="indefinite" restart="never" nodeType="tmRoot"/>
-      </p:par>
-    </p:tnLst>
-  </p:timing>
 </p:sld>
 </file>
 
@@ -20164,7 +20139,7 @@
               <a:buNone/>
             </a:pPr>
             <a:r>
-              <a:rPr lang="de-DE" sz="4800" b="1" smtClean="0">
+              <a:rPr lang="de-DE" sz="4800" b="1">
                 <a:solidFill>
                   <a:srgbClr val="00E1C6"/>
                 </a:solidFill>
@@ -20219,67 +20194,63 @@
               <a:buNone/>
             </a:pPr>
             <a:r>
-              <a:rPr lang="de-DE" smtClean="0"/>
+              <a:rPr lang="de-DE"/>
               <a:t>Average Time </a:t>
             </a:r>
             <a:r>
-              <a:rPr lang="de-DE" err="1" smtClean="0"/>
+              <a:rPr lang="de-DE" err="1"/>
               <a:t>to</a:t>
             </a:r>
             <a:r>
-              <a:rPr lang="de-DE" smtClean="0"/>
+              <a:rPr lang="de-DE"/>
               <a:t> </a:t>
             </a:r>
             <a:r>
-              <a:rPr lang="de-DE" err="1" smtClean="0"/>
+              <a:rPr lang="de-DE" err="1"/>
               <a:t>fetch</a:t>
             </a:r>
             <a:r>
-              <a:rPr lang="de-DE" smtClean="0"/>
+              <a:rPr lang="de-DE"/>
               <a:t> 9500 </a:t>
             </a:r>
             <a:r>
-              <a:rPr lang="de-DE" err="1" smtClean="0"/>
+              <a:rPr lang="de-DE" err="1"/>
               <a:t>records</a:t>
             </a:r>
             <a:r>
-              <a:rPr lang="de-DE" smtClean="0"/>
+              <a:rPr lang="de-DE"/>
               <a:t> </a:t>
             </a:r>
             <a:r>
-              <a:rPr lang="de-DE" err="1" smtClean="0"/>
+              <a:rPr lang="de-DE" err="1"/>
               <a:t>as</a:t>
             </a:r>
             <a:r>
-              <a:rPr lang="de-DE" smtClean="0"/>
+              <a:rPr lang="de-DE"/>
               <a:t> a </a:t>
             </a:r>
             <a:r>
-              <a:rPr lang="de-DE" err="1" smtClean="0"/>
+              <a:rPr lang="de-DE" err="1"/>
               <a:t>Map</a:t>
             </a:r>
             <a:r>
-              <a:rPr lang="de-DE" smtClean="0"/>
+              <a:rPr lang="de-DE"/>
               <a:t>&lt;</a:t>
             </a:r>
             <a:r>
-              <a:rPr lang="de-DE" err="1" smtClean="0"/>
+              <a:rPr lang="de-DE" err="1"/>
               <a:t>Id</a:t>
             </a:r>
             <a:r>
-              <a:rPr lang="de-DE" smtClean="0"/>
-              <a:t>, Product</a:t>
-            </a:r>
-            <a:r>
-              <a:rPr lang="de-DE" smtClean="0"/>
-              <a:t>2&gt; </a:t>
-            </a:r>
-            <a:r>
-              <a:rPr lang="de-DE" err="1" smtClean="0"/>
+              <a:rPr lang="de-DE"/>
+              <a:t>, Product2&gt; </a:t>
+            </a:r>
+            <a:r>
+              <a:rPr lang="de-DE" err="1"/>
               <a:t>through</a:t>
             </a:r>
             <a:r>
-              <a:rPr lang="de-DE" smtClean="0"/>
+              <a:rPr lang="de-DE"/>
               <a:t> SOQL</a:t>
             </a:r>
             <a:endParaRPr lang="en"/>
@@ -20318,7 +20289,7 @@
               <a:buNone/>
             </a:pPr>
             <a:r>
-              <a:rPr lang="de-DE" sz="4800" b="1" smtClean="0">
+              <a:rPr lang="de-DE" sz="4800" b="1">
                 <a:solidFill>
                   <a:srgbClr val="3292E1"/>
                 </a:solidFill>
@@ -20373,16 +20344,12 @@
               <a:buNone/>
             </a:pPr>
             <a:r>
-              <a:rPr lang="de-DE" err="1" smtClean="0"/>
+              <a:rPr lang="de-DE" err="1"/>
               <a:t>Faster</a:t>
             </a:r>
             <a:r>
               <a:rPr lang="de-DE"/>
-              <a:t> </a:t>
-            </a:r>
-            <a:r>
-              <a:rPr lang="de-DE" smtClean="0"/>
-              <a:t>Access </a:t>
+              <a:t> Access </a:t>
             </a:r>
           </a:p>
           <a:p>
@@ -20428,7 +20395,7 @@
               <a:buNone/>
             </a:pPr>
             <a:r>
-              <a:rPr lang="de-DE" sz="4800" b="1" smtClean="0">
+              <a:rPr lang="de-DE" sz="4800" b="1">
                 <a:latin typeface="Muli"/>
                 <a:ea typeface="Muli"/>
                 <a:cs typeface="Muli"/>
@@ -20477,87 +20444,83 @@
               <a:buNone/>
             </a:pPr>
             <a:r>
-              <a:rPr lang="de-DE" smtClean="0"/>
+              <a:rPr lang="de-DE"/>
               <a:t>Average time </a:t>
             </a:r>
             <a:r>
-              <a:rPr lang="de-DE" err="1" smtClean="0"/>
+              <a:rPr lang="de-DE" err="1"/>
               <a:t>to</a:t>
-            </a:r>
-            <a:r>
-              <a:rPr lang="de-DE" smtClean="0"/>
-              <a:t> </a:t>
-            </a:r>
-            <a:r>
-              <a:rPr lang="de-DE" err="1" smtClean="0"/>
-              <a:t>fetch</a:t>
-            </a:r>
-            <a:r>
-              <a:rPr lang="de-DE" smtClean="0"/>
-              <a:t> </a:t>
-            </a:r>
-            <a:r>
-              <a:rPr lang="de-DE" err="1" smtClean="0"/>
-              <a:t>the</a:t>
-            </a:r>
-            <a:r>
-              <a:rPr lang="de-DE" smtClean="0"/>
-              <a:t> same </a:t>
-            </a:r>
-            <a:r>
-              <a:rPr lang="de-DE" err="1" smtClean="0"/>
-              <a:t>map</a:t>
-            </a:r>
-            <a:r>
-              <a:rPr lang="de-DE" smtClean="0"/>
-              <a:t> </a:t>
-            </a:r>
-            <a:r>
-              <a:rPr lang="de-DE" err="1" smtClean="0"/>
-              <a:t>of</a:t>
             </a:r>
             <a:r>
               <a:rPr lang="de-DE"/>
               <a:t> </a:t>
             </a:r>
             <a:r>
-              <a:rPr lang="de-DE" smtClean="0"/>
-              <a:t>Product2 </a:t>
-            </a:r>
-            <a:r>
-              <a:rPr lang="de-DE" err="1" smtClean="0"/>
+              <a:rPr lang="de-DE" err="1"/>
+              <a:t>fetch</a:t>
+            </a:r>
+            <a:r>
+              <a:rPr lang="de-DE"/>
+              <a:t> </a:t>
+            </a:r>
+            <a:r>
+              <a:rPr lang="de-DE" err="1"/>
+              <a:t>the</a:t>
+            </a:r>
+            <a:r>
+              <a:rPr lang="de-DE"/>
+              <a:t> same </a:t>
+            </a:r>
+            <a:r>
+              <a:rPr lang="de-DE" err="1"/>
+              <a:t>map</a:t>
+            </a:r>
+            <a:r>
+              <a:rPr lang="de-DE"/>
+              <a:t> </a:t>
+            </a:r>
+            <a:r>
+              <a:rPr lang="de-DE" err="1"/>
+              <a:t>of</a:t>
+            </a:r>
+            <a:r>
+              <a:rPr lang="de-DE"/>
+              <a:t> Product2 </a:t>
+            </a:r>
+            <a:r>
+              <a:rPr lang="de-DE" err="1"/>
               <a:t>sObjects</a:t>
             </a:r>
             <a:r>
-              <a:rPr lang="de-DE" smtClean="0"/>
+              <a:rPr lang="de-DE"/>
               <a:t> </a:t>
             </a:r>
             <a:r>
-              <a:rPr lang="de-DE" err="1" smtClean="0"/>
+              <a:rPr lang="de-DE" err="1"/>
               <a:t>from</a:t>
             </a:r>
             <a:r>
-              <a:rPr lang="de-DE" smtClean="0"/>
+              <a:rPr lang="de-DE"/>
               <a:t> </a:t>
             </a:r>
             <a:r>
-              <a:rPr lang="de-DE" err="1" smtClean="0"/>
+              <a:rPr lang="de-DE" err="1"/>
               <a:t>the</a:t>
             </a:r>
             <a:r>
-              <a:rPr lang="de-DE" smtClean="0"/>
+              <a:rPr lang="de-DE"/>
               <a:t> </a:t>
             </a:r>
             <a:r>
-              <a:rPr lang="de-DE" err="1" smtClean="0"/>
+              <a:rPr lang="de-DE" err="1"/>
               <a:t>Org</a:t>
             </a:r>
             <a:r>
-              <a:rPr lang="de-DE" smtClean="0"/>
+              <a:rPr lang="de-DE"/>
               <a:t> </a:t>
             </a:r>
             <a:r>
-              <a:rPr lang="de-DE" err="1" smtClean="0"/>
+              <a:rPr lang="de-DE" err="1"/>
               <a:t>cache</a:t>
             </a:r>
             <a:endParaRPr lang="en"/>
@@ -20569,13 +20532,6 @@
   <p:clrMapOvr>
     <a:masterClrMapping/>
   </p:clrMapOvr>
-  <p:timing>
-    <p:tnLst>
-      <p:par>
-        <p:cTn id="1" dur="indefinite" restart="never" nodeType="tmRoot"/>
-      </p:par>
-    </p:tnLst>
-  </p:timing>
 </p:sld>
 </file>
 
@@ -20628,19 +20584,19 @@
               <a:buNone/>
             </a:pPr>
             <a:r>
-              <a:rPr lang="de-DE" smtClean="0"/>
+              <a:rPr lang="de-DE"/>
               <a:t>Data </a:t>
             </a:r>
             <a:r>
-              <a:rPr lang="de-DE" err="1" smtClean="0"/>
+              <a:rPr lang="de-DE" err="1"/>
               <a:t>to</a:t>
             </a:r>
             <a:r>
-              <a:rPr lang="de-DE" smtClean="0"/>
+              <a:rPr lang="de-DE"/>
               <a:t> </a:t>
             </a:r>
             <a:r>
-              <a:rPr lang="de-DE" err="1" smtClean="0"/>
+              <a:rPr lang="de-DE" err="1"/>
               <a:t>cache</a:t>
             </a:r>
             <a:endParaRPr lang="en"/>
@@ -20681,7 +20637,7 @@
               </a:spcBef>
             </a:pPr>
             <a:r>
-              <a:rPr lang="de-DE" smtClean="0"/>
+              <a:rPr lang="de-DE"/>
               <a:t>PREPARABLE - REUSABLE</a:t>
             </a:r>
           </a:p>
@@ -20695,30 +20651,30 @@
               </a:spcBef>
             </a:pPr>
             <a:r>
-              <a:rPr lang="de-DE" smtClean="0"/>
+              <a:rPr lang="de-DE"/>
               <a:t>Data </a:t>
             </a:r>
             <a:r>
-              <a:rPr lang="de-DE" err="1" smtClean="0"/>
+              <a:rPr lang="de-DE" err="1"/>
               <a:t>frequently</a:t>
             </a:r>
             <a:r>
-              <a:rPr lang="de-DE" smtClean="0"/>
+              <a:rPr lang="de-DE"/>
               <a:t> </a:t>
             </a:r>
             <a:r>
-              <a:rPr lang="de-DE" err="1" smtClean="0"/>
+              <a:rPr lang="de-DE" err="1"/>
               <a:t>needed</a:t>
             </a:r>
             <a:r>
-              <a:rPr lang="de-DE" smtClean="0"/>
+              <a:rPr lang="de-DE"/>
               <a:t> in </a:t>
             </a:r>
             <a:r>
-              <a:rPr lang="de-DE" err="1" smtClean="0"/>
+              <a:rPr lang="de-DE" err="1"/>
               <a:t>operations</a:t>
             </a:r>
-            <a:endParaRPr lang="de-DE" smtClean="0"/>
+            <a:endParaRPr lang="de-DE"/>
           </a:p>
           <a:p>
             <a:pPr marL="457200" lvl="0" indent="-228600" rtl="0">
@@ -20730,18 +20686,18 @@
               </a:spcBef>
             </a:pPr>
             <a:r>
-              <a:rPr lang="de-DE" err="1" smtClean="0"/>
+              <a:rPr lang="de-DE" err="1"/>
               <a:t>Static</a:t>
             </a:r>
             <a:r>
-              <a:rPr lang="de-DE" smtClean="0"/>
+              <a:rPr lang="de-DE"/>
               <a:t> </a:t>
             </a:r>
             <a:r>
-              <a:rPr lang="de-DE" err="1" smtClean="0"/>
+              <a:rPr lang="de-DE" err="1"/>
               <a:t>data</a:t>
             </a:r>
-            <a:endParaRPr lang="de-DE" smtClean="0"/>
+            <a:endParaRPr lang="de-DE"/>
           </a:p>
           <a:p>
             <a:pPr marL="457200" lvl="0" indent="-228600" rtl="0">
@@ -20753,55 +20709,55 @@
               </a:spcBef>
             </a:pPr>
             <a:r>
-              <a:rPr lang="de-DE" smtClean="0"/>
+              <a:rPr lang="de-DE"/>
               <a:t>Expensive </a:t>
             </a:r>
             <a:r>
-              <a:rPr lang="de-DE" err="1" smtClean="0"/>
+              <a:rPr lang="de-DE" err="1"/>
               <a:t>to</a:t>
             </a:r>
             <a:r>
-              <a:rPr lang="de-DE" smtClean="0"/>
+              <a:rPr lang="de-DE"/>
               <a:t> </a:t>
             </a:r>
             <a:r>
-              <a:rPr lang="de-DE" err="1" smtClean="0"/>
+              <a:rPr lang="de-DE" err="1"/>
               <a:t>get</a:t>
             </a:r>
             <a:r>
-              <a:rPr lang="de-DE" smtClean="0"/>
+              <a:rPr lang="de-DE"/>
               <a:t> (in </a:t>
             </a:r>
             <a:r>
-              <a:rPr lang="de-DE" err="1" smtClean="0"/>
+              <a:rPr lang="de-DE" err="1"/>
               <a:t>terms</a:t>
             </a:r>
             <a:r>
-              <a:rPr lang="de-DE" smtClean="0"/>
+              <a:rPr lang="de-DE"/>
               <a:t> </a:t>
             </a:r>
             <a:r>
-              <a:rPr lang="de-DE" err="1" smtClean="0"/>
+              <a:rPr lang="de-DE" err="1"/>
               <a:t>of</a:t>
             </a:r>
             <a:r>
-              <a:rPr lang="de-DE" smtClean="0"/>
+              <a:rPr lang="de-DE"/>
               <a:t> </a:t>
             </a:r>
             <a:r>
-              <a:rPr lang="de-DE" err="1" smtClean="0"/>
+              <a:rPr lang="de-DE" err="1"/>
               <a:t>system</a:t>
             </a:r>
             <a:r>
-              <a:rPr lang="de-DE" smtClean="0"/>
+              <a:rPr lang="de-DE"/>
               <a:t> </a:t>
             </a:r>
             <a:r>
-              <a:rPr lang="de-DE" err="1" smtClean="0"/>
+              <a:rPr lang="de-DE" err="1"/>
               <a:t>limits</a:t>
             </a:r>
             <a:r>
-              <a:rPr lang="de-DE" smtClean="0"/>
+              <a:rPr lang="de-DE"/>
               <a:t>)</a:t>
             </a:r>
           </a:p>
@@ -20815,35 +20771,35 @@
               </a:spcBef>
             </a:pPr>
             <a:r>
-              <a:rPr lang="de-DE" err="1" smtClean="0"/>
+              <a:rPr lang="de-DE" err="1"/>
               <a:t>Taxonomies</a:t>
             </a:r>
             <a:r>
-              <a:rPr lang="de-DE" smtClean="0"/>
+              <a:rPr lang="de-DE"/>
               <a:t>, </a:t>
             </a:r>
             <a:r>
-              <a:rPr lang="de-DE" err="1" smtClean="0"/>
+              <a:rPr lang="de-DE" err="1"/>
               <a:t>Schedules</a:t>
             </a:r>
             <a:r>
-              <a:rPr lang="de-DE" smtClean="0"/>
+              <a:rPr lang="de-DE"/>
               <a:t>, </a:t>
             </a:r>
             <a:r>
-              <a:rPr lang="de-DE" err="1" smtClean="0"/>
+              <a:rPr lang="de-DE" err="1"/>
               <a:t>Mappings</a:t>
             </a:r>
             <a:r>
-              <a:rPr lang="de-DE" smtClean="0"/>
+              <a:rPr lang="de-DE"/>
               <a:t>, </a:t>
             </a:r>
             <a:r>
-              <a:rPr lang="de-DE" err="1" smtClean="0"/>
+              <a:rPr lang="de-DE" err="1"/>
               <a:t>Conversion</a:t>
             </a:r>
             <a:r>
-              <a:rPr lang="de-DE" smtClean="0"/>
+              <a:rPr lang="de-DE"/>
               <a:t> Rates, etc.</a:t>
             </a:r>
           </a:p>
@@ -20856,7 +20812,7 @@
                 <a:spcPts val="0"/>
               </a:spcBef>
             </a:pPr>
-            <a:endParaRPr lang="de-DE" smtClean="0"/>
+            <a:endParaRPr lang="de-DE"/>
           </a:p>
           <a:p>
             <a:pPr marL="457200" lvl="0" indent="-228600" rtl="0">
@@ -20881,13 +20837,6 @@
   <p:clrMapOvr>
     <a:masterClrMapping/>
   </p:clrMapOvr>
-  <p:timing>
-    <p:tnLst>
-      <p:par>
-        <p:cTn id="1" dur="indefinite" restart="never" nodeType="tmRoot"/>
-      </p:par>
-    </p:tnLst>
-  </p:timing>
 </p:sld>
 </file>
 
@@ -20940,35 +20889,27 @@
               <a:buNone/>
             </a:pPr>
             <a:r>
-              <a:rPr lang="de-DE" smtClean="0"/>
-              <a:t>Nice! </a:t>
-            </a:r>
-            <a:r>
-              <a:rPr lang="de-DE" smtClean="0"/>
-              <a:t>Easy! Fast!</a:t>
+              <a:rPr lang="de-DE"/>
+              <a:t>Nice! Easy! Fast!</a:t>
             </a:r>
             <a:br>
-              <a:rPr lang="de-DE" smtClean="0"/>
+              <a:rPr lang="de-DE"/>
             </a:br>
             <a:r>
-              <a:rPr lang="de-DE" err="1" smtClean="0"/>
+              <a:rPr lang="de-DE" err="1"/>
               <a:t>Where‘s</a:t>
             </a:r>
             <a:r>
-              <a:rPr lang="de-DE" smtClean="0"/>
+              <a:rPr lang="de-DE"/>
               <a:t> </a:t>
             </a:r>
             <a:r>
-              <a:rPr lang="de-DE" err="1" smtClean="0"/>
+              <a:rPr lang="de-DE" err="1"/>
               <a:t>the</a:t>
             </a:r>
             <a:r>
-              <a:rPr lang="de-DE" smtClean="0"/>
-              <a:t> </a:t>
-            </a:r>
-            <a:r>
-              <a:rPr lang="de-DE" smtClean="0"/>
-              <a:t>catch?</a:t>
+              <a:rPr lang="de-DE"/>
+              <a:t> catch?</a:t>
             </a:r>
             <a:endParaRPr lang="en"/>
           </a:p>
@@ -21007,7 +20948,7 @@
                 <a:spcPts val="0"/>
               </a:spcBef>
             </a:pPr>
-            <a:endParaRPr lang="de-DE" smtClean="0"/>
+            <a:endParaRPr lang="de-DE"/>
           </a:p>
           <a:p>
             <a:pPr marL="457200" lvl="0" indent="-228600" rtl="0">
@@ -21019,27 +20960,27 @@
               </a:spcBef>
             </a:pPr>
             <a:r>
-              <a:rPr lang="de-DE" err="1" smtClean="0"/>
+              <a:rPr lang="de-DE" err="1"/>
               <a:t>It‘s</a:t>
             </a:r>
             <a:r>
-              <a:rPr lang="de-DE" smtClean="0"/>
+              <a:rPr lang="de-DE"/>
               <a:t> still a </a:t>
             </a:r>
             <a:r>
-              <a:rPr lang="de-DE" err="1" smtClean="0"/>
+              <a:rPr lang="de-DE" err="1"/>
               <a:t>cache</a:t>
             </a:r>
             <a:r>
-              <a:rPr lang="de-DE" smtClean="0"/>
+              <a:rPr lang="de-DE"/>
               <a:t>, not a </a:t>
             </a:r>
             <a:r>
-              <a:rPr lang="de-DE" err="1" smtClean="0"/>
+              <a:rPr lang="de-DE" err="1"/>
               <a:t>database</a:t>
             </a:r>
             <a:r>
-              <a:rPr lang="de-DE" smtClean="0"/>
+              <a:rPr lang="de-DE"/>
               <a:t>.</a:t>
             </a:r>
           </a:p>
@@ -21053,34 +20994,34 @@
               </a:spcBef>
             </a:pPr>
             <a:r>
-              <a:rPr lang="de-DE" err="1" smtClean="0"/>
+              <a:rPr lang="de-DE" err="1"/>
               <a:t>It</a:t>
             </a:r>
             <a:r>
-              <a:rPr lang="de-DE" smtClean="0"/>
+              <a:rPr lang="de-DE"/>
               <a:t> </a:t>
             </a:r>
             <a:r>
-              <a:rPr lang="de-DE" err="1" smtClean="0"/>
+              <a:rPr lang="de-DE" err="1"/>
               <a:t>is</a:t>
             </a:r>
             <a:r>
-              <a:rPr lang="de-DE" smtClean="0"/>
+              <a:rPr lang="de-DE"/>
               <a:t> </a:t>
             </a:r>
             <a:r>
-              <a:rPr lang="de-DE" err="1" smtClean="0"/>
+              <a:rPr lang="de-DE" err="1"/>
               <a:t>short</a:t>
             </a:r>
             <a:r>
-              <a:rPr lang="de-DE" smtClean="0"/>
+              <a:rPr lang="de-DE"/>
               <a:t> </a:t>
             </a:r>
             <a:r>
-              <a:rPr lang="de-DE" err="1" smtClean="0"/>
+              <a:rPr lang="de-DE" err="1"/>
               <a:t>lived</a:t>
             </a:r>
-            <a:endParaRPr lang="de-DE" smtClean="0"/>
+            <a:endParaRPr lang="de-DE"/>
           </a:p>
           <a:p>
             <a:pPr marL="457200" lvl="0" indent="-228600" rtl="0">
@@ -21092,82 +21033,82 @@
               </a:spcBef>
             </a:pPr>
             <a:r>
-              <a:rPr lang="de-DE" err="1" smtClean="0"/>
+              <a:rPr lang="de-DE" err="1"/>
               <a:t>Understand</a:t>
             </a:r>
             <a:r>
-              <a:rPr lang="de-DE" smtClean="0"/>
+              <a:rPr lang="de-DE"/>
               <a:t> </a:t>
             </a:r>
             <a:r>
-              <a:rPr lang="de-DE" err="1" smtClean="0"/>
+              <a:rPr lang="de-DE" err="1"/>
               <a:t>the</a:t>
             </a:r>
             <a:r>
-              <a:rPr lang="de-DE" smtClean="0"/>
+              <a:rPr lang="de-DE"/>
               <a:t> </a:t>
             </a:r>
             <a:r>
-              <a:rPr lang="de-DE" err="1" smtClean="0"/>
+              <a:rPr lang="de-DE" err="1"/>
               <a:t>key</a:t>
             </a:r>
             <a:r>
-              <a:rPr lang="de-DE" smtClean="0"/>
+              <a:rPr lang="de-DE"/>
               <a:t> </a:t>
             </a:r>
             <a:r>
-              <a:rPr lang="de-DE" err="1" smtClean="0"/>
+              <a:rPr lang="de-DE" err="1"/>
               <a:t>concepts</a:t>
             </a:r>
             <a:r>
-              <a:rPr lang="de-DE" smtClean="0"/>
+              <a:rPr lang="de-DE"/>
               <a:t> </a:t>
             </a:r>
             <a:r>
-              <a:rPr lang="de-DE" err="1" smtClean="0"/>
+              <a:rPr lang="de-DE" err="1"/>
               <a:t>of</a:t>
             </a:r>
             <a:r>
-              <a:rPr lang="de-DE" smtClean="0"/>
+              <a:rPr lang="de-DE"/>
               <a:t> </a:t>
             </a:r>
             <a:r>
-              <a:rPr lang="de-DE" err="1" smtClean="0"/>
+              <a:rPr lang="de-DE" err="1"/>
               <a:t>the</a:t>
             </a:r>
             <a:r>
-              <a:rPr lang="de-DE" smtClean="0"/>
+              <a:rPr lang="de-DE"/>
               <a:t> </a:t>
             </a:r>
             <a:r>
-              <a:rPr lang="de-DE" err="1" smtClean="0"/>
+              <a:rPr lang="de-DE" err="1"/>
               <a:t>platform</a:t>
             </a:r>
             <a:r>
-              <a:rPr lang="de-DE" smtClean="0"/>
+              <a:rPr lang="de-DE"/>
               <a:t> </a:t>
             </a:r>
             <a:r>
-              <a:rPr lang="de-DE" err="1" smtClean="0"/>
+              <a:rPr lang="de-DE" err="1"/>
               <a:t>cache</a:t>
             </a:r>
             <a:r>
-              <a:rPr lang="de-DE" smtClean="0"/>
+              <a:rPr lang="de-DE"/>
               <a:t> </a:t>
             </a:r>
             <a:br>
-              <a:rPr lang="de-DE" smtClean="0"/>
+              <a:rPr lang="de-DE"/>
             </a:br>
             <a:r>
-              <a:rPr lang="de-DE" smtClean="0"/>
+              <a:rPr lang="de-DE"/>
               <a:t>(in </a:t>
             </a:r>
             <a:r>
-              <a:rPr lang="de-DE" err="1" smtClean="0"/>
+              <a:rPr lang="de-DE" err="1"/>
               <a:t>particular</a:t>
             </a:r>
             <a:r>
-              <a:rPr lang="de-DE" smtClean="0"/>
+              <a:rPr lang="de-DE"/>
               <a:t> TTL, LRU)</a:t>
             </a:r>
           </a:p>
@@ -21181,51 +21122,51 @@
               </a:spcBef>
             </a:pPr>
             <a:r>
-              <a:rPr lang="de-DE" err="1" smtClean="0"/>
+              <a:rPr lang="de-DE" err="1"/>
               <a:t>Expect</a:t>
             </a:r>
             <a:r>
-              <a:rPr lang="de-DE" smtClean="0"/>
+              <a:rPr lang="de-DE"/>
               <a:t> </a:t>
             </a:r>
             <a:r>
-              <a:rPr lang="de-DE" err="1" smtClean="0"/>
+              <a:rPr lang="de-DE" err="1"/>
               <a:t>the</a:t>
             </a:r>
             <a:r>
-              <a:rPr lang="de-DE" smtClean="0"/>
+              <a:rPr lang="de-DE"/>
               <a:t> </a:t>
             </a:r>
             <a:r>
-              <a:rPr lang="de-DE" err="1" smtClean="0"/>
+              <a:rPr lang="de-DE" err="1"/>
               <a:t>cache</a:t>
             </a:r>
             <a:r>
-              <a:rPr lang="de-DE" smtClean="0"/>
+              <a:rPr lang="de-DE"/>
               <a:t> </a:t>
             </a:r>
             <a:r>
-              <a:rPr lang="de-DE" err="1" smtClean="0"/>
+              <a:rPr lang="de-DE" err="1"/>
               <a:t>to</a:t>
             </a:r>
             <a:r>
-              <a:rPr lang="de-DE" smtClean="0"/>
+              <a:rPr lang="de-DE"/>
               <a:t> </a:t>
             </a:r>
             <a:r>
-              <a:rPr lang="de-DE" err="1" smtClean="0"/>
+              <a:rPr lang="de-DE" err="1"/>
               <a:t>fail</a:t>
             </a:r>
             <a:r>
-              <a:rPr lang="de-DE" smtClean="0"/>
+              <a:rPr lang="de-DE"/>
               <a:t> </a:t>
             </a:r>
             <a:r>
-              <a:rPr lang="de-DE" err="1" smtClean="0"/>
+              <a:rPr lang="de-DE" err="1"/>
               <a:t>you</a:t>
             </a:r>
             <a:r>
-              <a:rPr lang="de-DE" smtClean="0"/>
+              <a:rPr lang="de-DE"/>
               <a:t>.</a:t>
             </a:r>
           </a:p>
@@ -21241,13 +21182,6 @@
   <p:clrMapOvr>
     <a:masterClrMapping/>
   </p:clrMapOvr>
-  <p:timing>
-    <p:tnLst>
-      <p:par>
-        <p:cTn id="1" dur="indefinite" restart="never" nodeType="tmRoot"/>
-      </p:par>
-    </p:tnLst>
-  </p:timing>
 </p:sld>
 </file>
 
@@ -21300,23 +21234,23 @@
               <a:buNone/>
             </a:pPr>
             <a:r>
-              <a:rPr lang="de-DE" err="1" smtClean="0"/>
+              <a:rPr lang="de-DE" err="1"/>
               <a:t>Build</a:t>
             </a:r>
             <a:r>
-              <a:rPr lang="de-DE" smtClean="0"/>
+              <a:rPr lang="de-DE"/>
               <a:t> </a:t>
             </a:r>
             <a:r>
-              <a:rPr lang="de-DE" err="1" smtClean="0"/>
+              <a:rPr lang="de-DE" err="1"/>
               <a:t>your</a:t>
             </a:r>
             <a:r>
-              <a:rPr lang="de-DE" smtClean="0"/>
+              <a:rPr lang="de-DE"/>
               <a:t> </a:t>
             </a:r>
             <a:r>
-              <a:rPr lang="de-DE" err="1" smtClean="0"/>
+              <a:rPr lang="de-DE" err="1"/>
               <a:t>Strategies</a:t>
             </a:r>
             <a:endParaRPr lang="en"/>
@@ -21356,7 +21290,7 @@
                 <a:spcPts val="0"/>
               </a:spcBef>
             </a:pPr>
-            <a:endParaRPr lang="de-DE" smtClean="0"/>
+            <a:endParaRPr lang="de-DE"/>
           </a:p>
           <a:p>
             <a:pPr marL="457200" lvl="0" indent="-228600">
@@ -21365,30 +21299,30 @@
               </a:lnSpc>
             </a:pPr>
             <a:r>
-              <a:rPr lang="de-DE" smtClean="0"/>
+              <a:rPr lang="de-DE"/>
               <a:t>The Cache will </a:t>
             </a:r>
             <a:r>
-              <a:rPr lang="de-DE" err="1" smtClean="0"/>
+              <a:rPr lang="de-DE" err="1"/>
               <a:t>go</a:t>
             </a:r>
             <a:r>
-              <a:rPr lang="de-DE" smtClean="0"/>
+              <a:rPr lang="de-DE"/>
               <a:t> </a:t>
             </a:r>
             <a:r>
-              <a:rPr lang="de-DE" err="1" smtClean="0"/>
+              <a:rPr lang="de-DE" err="1"/>
               <a:t>away</a:t>
             </a:r>
             <a:r>
-              <a:rPr lang="de-DE" smtClean="0"/>
+              <a:rPr lang="de-DE"/>
               <a:t>... </a:t>
             </a:r>
             <a:br>
-              <a:rPr lang="de-DE" smtClean="0"/>
+              <a:rPr lang="de-DE"/>
             </a:br>
             <a:r>
-              <a:rPr lang="de-DE" err="1" smtClean="0">
+              <a:rPr lang="de-DE" err="1">
                 <a:solidFill>
                   <a:srgbClr val="19BBD5"/>
                 </a:solidFill>
@@ -21396,7 +21330,7 @@
               <a:t>Have</a:t>
             </a:r>
             <a:r>
-              <a:rPr lang="de-DE" smtClean="0">
+              <a:rPr lang="de-DE">
                 <a:solidFill>
                   <a:srgbClr val="19BBD5"/>
                 </a:solidFill>
@@ -21404,7 +21338,7 @@
               <a:t> a </a:t>
             </a:r>
             <a:r>
-              <a:rPr lang="de-DE" err="1" smtClean="0">
+              <a:rPr lang="de-DE" err="1">
                 <a:solidFill>
                   <a:srgbClr val="19BBD5"/>
                 </a:solidFill>
@@ -21412,7 +21346,7 @@
               <a:t>rebuild</a:t>
             </a:r>
             <a:r>
-              <a:rPr lang="de-DE" smtClean="0">
+              <a:rPr lang="de-DE">
                 <a:solidFill>
                   <a:srgbClr val="19BBD5"/>
                 </a:solidFill>
@@ -21420,97 +21354,7 @@
               <a:t> </a:t>
             </a:r>
             <a:r>
-              <a:rPr lang="de-DE" err="1" smtClean="0">
-                <a:solidFill>
-                  <a:srgbClr val="19BBD5"/>
-                </a:solidFill>
-              </a:rPr>
-              <a:t>strategy</a:t>
-            </a:r>
-            <a:endParaRPr lang="de-DE" smtClean="0">
-              <a:solidFill>
-                <a:srgbClr val="19BBD5"/>
-              </a:solidFill>
-            </a:endParaRPr>
-          </a:p>
-          <a:p>
-            <a:pPr marL="457200" lvl="0" indent="-228600" rtl="0">
-              <a:lnSpc>
-                <a:spcPct val="150000"/>
-              </a:lnSpc>
-              <a:spcBef>
-                <a:spcPts val="0"/>
-              </a:spcBef>
-            </a:pPr>
-            <a:r>
-              <a:rPr lang="de-DE" err="1" smtClean="0"/>
-              <a:t>Cached</a:t>
-            </a:r>
-            <a:r>
-              <a:rPr lang="de-DE" smtClean="0"/>
-              <a:t> </a:t>
-            </a:r>
-            <a:r>
-              <a:rPr lang="de-DE" err="1" smtClean="0"/>
-              <a:t>items</a:t>
-            </a:r>
-            <a:r>
-              <a:rPr lang="de-DE" smtClean="0"/>
-              <a:t> will </a:t>
-            </a:r>
-            <a:r>
-              <a:rPr lang="de-DE" err="1" smtClean="0"/>
-              <a:t>be</a:t>
-            </a:r>
-            <a:r>
-              <a:rPr lang="de-DE" smtClean="0"/>
-              <a:t> </a:t>
-            </a:r>
-            <a:r>
-              <a:rPr lang="de-DE" err="1" smtClean="0"/>
-              <a:t>pushed</a:t>
-            </a:r>
-            <a:r>
-              <a:rPr lang="de-DE" smtClean="0"/>
-              <a:t> out</a:t>
-            </a:r>
-            <a:br>
-              <a:rPr lang="de-DE" smtClean="0"/>
-            </a:br>
-            <a:r>
-              <a:rPr lang="de-DE" err="1" smtClean="0">
-                <a:solidFill>
-                  <a:srgbClr val="19BBD5"/>
-                </a:solidFill>
-              </a:rPr>
-              <a:t>Have</a:t>
-            </a:r>
-            <a:r>
-              <a:rPr lang="de-DE" smtClean="0">
-                <a:solidFill>
-                  <a:srgbClr val="19BBD5"/>
-                </a:solidFill>
-              </a:rPr>
-              <a:t> a </a:t>
-            </a:r>
-            <a:r>
-              <a:rPr lang="de-DE" err="1" smtClean="0">
-                <a:solidFill>
-                  <a:srgbClr val="19BBD5"/>
-                </a:solidFill>
-              </a:rPr>
-              <a:t>fallback</a:t>
-            </a:r>
-            <a:r>
-              <a:rPr lang="de-DE" smtClean="0">
-                <a:solidFill>
-                  <a:srgbClr val="19BBD5"/>
-                </a:solidFill>
-              </a:rPr>
-              <a:t> </a:t>
-            </a:r>
-            <a:r>
-              <a:rPr lang="de-DE" err="1" smtClean="0">
+              <a:rPr lang="de-DE" err="1">
                 <a:solidFill>
                   <a:srgbClr val="19BBD5"/>
                 </a:solidFill>
@@ -21533,74 +21377,66 @@
               </a:spcBef>
             </a:pPr>
             <a:r>
-              <a:rPr lang="de-DE" err="1" smtClean="0"/>
+              <a:rPr lang="de-DE" err="1"/>
               <a:t>Cached</a:t>
             </a:r>
             <a:r>
-              <a:rPr lang="de-DE" smtClean="0"/>
+              <a:rPr lang="de-DE"/>
               <a:t> </a:t>
             </a:r>
             <a:r>
-              <a:rPr lang="de-DE" err="1" smtClean="0"/>
+              <a:rPr lang="de-DE" err="1"/>
               <a:t>items</a:t>
             </a:r>
             <a:r>
-              <a:rPr lang="de-DE" smtClean="0"/>
-              <a:t> must </a:t>
-            </a:r>
-            <a:r>
-              <a:rPr lang="de-DE" err="1" smtClean="0"/>
-              <a:t>adhere</a:t>
-            </a:r>
-            <a:r>
-              <a:rPr lang="de-DE" smtClean="0"/>
+              <a:rPr lang="de-DE"/>
+              <a:t> will </a:t>
+            </a:r>
+            <a:r>
+              <a:rPr lang="de-DE" err="1"/>
+              <a:t>be</a:t>
+            </a:r>
+            <a:r>
+              <a:rPr lang="de-DE"/>
               <a:t> </a:t>
             </a:r>
             <a:r>
-              <a:rPr lang="de-DE" err="1" smtClean="0"/>
-              <a:t>to</a:t>
-            </a:r>
-            <a:r>
-              <a:rPr lang="de-DE" smtClean="0"/>
-              <a:t> </a:t>
-            </a:r>
-            <a:r>
-              <a:rPr lang="de-DE" err="1" smtClean="0"/>
-              <a:t>the</a:t>
-            </a:r>
-            <a:r>
-              <a:rPr lang="de-DE" smtClean="0"/>
-              <a:t> 100kB </a:t>
-            </a:r>
-            <a:r>
-              <a:rPr lang="de-DE" err="1" smtClean="0"/>
-              <a:t>size</a:t>
-            </a:r>
-            <a:r>
-              <a:rPr lang="de-DE" smtClean="0"/>
-              <a:t> </a:t>
-            </a:r>
-            <a:r>
-              <a:rPr lang="de-DE" err="1" smtClean="0"/>
-              <a:t>limits</a:t>
+              <a:rPr lang="de-DE" err="1"/>
+              <a:t>pushed</a:t>
             </a:r>
             <a:r>
               <a:rPr lang="de-DE"/>
-              <a:t/>
+              <a:t> out</a:t>
             </a:r>
             <a:br>
               <a:rPr lang="de-DE"/>
             </a:br>
             <a:r>
-              <a:rPr lang="de-DE" err="1" smtClean="0">
+              <a:rPr lang="de-DE" err="1">
                 <a:solidFill>
                   <a:srgbClr val="19BBD5"/>
                 </a:solidFill>
               </a:rPr>
-              <a:t>Know</a:t>
-            </a:r>
-            <a:r>
-              <a:rPr lang="de-DE" smtClean="0">
+              <a:t>Have</a:t>
+            </a:r>
+            <a:r>
+              <a:rPr lang="de-DE">
+                <a:solidFill>
+                  <a:srgbClr val="19BBD5"/>
+                </a:solidFill>
+              </a:rPr>
+              <a:t> a </a:t>
+            </a:r>
+            <a:r>
+              <a:rPr lang="de-DE" err="1">
+                <a:solidFill>
+                  <a:srgbClr val="19BBD5"/>
+                </a:solidFill>
+              </a:rPr>
+              <a:t>fallback</a:t>
+            </a:r>
+            <a:r>
+              <a:rPr lang="de-DE">
                 <a:solidFill>
                   <a:srgbClr val="19BBD5"/>
                 </a:solidFill>
@@ -21608,110 +21444,14 @@
               <a:t> </a:t>
             </a:r>
             <a:r>
-              <a:rPr lang="de-DE" err="1" smtClean="0">
+              <a:rPr lang="de-DE" err="1">
                 <a:solidFill>
                   <a:srgbClr val="19BBD5"/>
                 </a:solidFill>
               </a:rPr>
-              <a:t>what</a:t>
-            </a:r>
-            <a:r>
-              <a:rPr lang="de-DE" smtClean="0">
-                <a:solidFill>
-                  <a:srgbClr val="19BBD5"/>
-                </a:solidFill>
-              </a:rPr>
-              <a:t> </a:t>
-            </a:r>
-            <a:r>
-              <a:rPr lang="de-DE" err="1" smtClean="0">
-                <a:solidFill>
-                  <a:srgbClr val="19BBD5"/>
-                </a:solidFill>
-              </a:rPr>
-              <a:t>to</a:t>
-            </a:r>
-            <a:r>
-              <a:rPr lang="de-DE" smtClean="0">
-                <a:solidFill>
-                  <a:srgbClr val="19BBD5"/>
-                </a:solidFill>
-              </a:rPr>
-              <a:t> </a:t>
-            </a:r>
-            <a:r>
-              <a:rPr lang="de-DE" err="1" smtClean="0">
-                <a:solidFill>
-                  <a:srgbClr val="19BBD5"/>
-                </a:solidFill>
-              </a:rPr>
-              <a:t>cache</a:t>
-            </a:r>
-            <a:r>
-              <a:rPr lang="de-DE" smtClean="0">
-                <a:solidFill>
-                  <a:srgbClr val="19BBD5"/>
-                </a:solidFill>
-              </a:rPr>
-              <a:t> </a:t>
-            </a:r>
-            <a:r>
-              <a:rPr lang="de-DE" err="1" smtClean="0">
-                <a:solidFill>
-                  <a:srgbClr val="19BBD5"/>
-                </a:solidFill>
-              </a:rPr>
-              <a:t>and</a:t>
-            </a:r>
-            <a:r>
-              <a:rPr lang="de-DE" smtClean="0">
-                <a:solidFill>
-                  <a:srgbClr val="19BBD5"/>
-                </a:solidFill>
-              </a:rPr>
-              <a:t> </a:t>
-            </a:r>
-            <a:r>
-              <a:rPr lang="de-DE" err="1" smtClean="0">
-                <a:solidFill>
-                  <a:srgbClr val="19BBD5"/>
-                </a:solidFill>
-              </a:rPr>
-              <a:t>how</a:t>
-            </a:r>
-            <a:r>
-              <a:rPr lang="de-DE" smtClean="0">
-                <a:solidFill>
-                  <a:srgbClr val="19BBD5"/>
-                </a:solidFill>
-              </a:rPr>
-              <a:t> </a:t>
-            </a:r>
-            <a:r>
-              <a:rPr lang="de-DE" err="1" smtClean="0">
-                <a:solidFill>
-                  <a:srgbClr val="19BBD5"/>
-                </a:solidFill>
-              </a:rPr>
-              <a:t>to</a:t>
-            </a:r>
-            <a:r>
-              <a:rPr lang="de-DE" smtClean="0">
-                <a:solidFill>
-                  <a:srgbClr val="19BBD5"/>
-                </a:solidFill>
-              </a:rPr>
-              <a:t> </a:t>
-            </a:r>
-            <a:r>
-              <a:rPr lang="de-DE" err="1" smtClean="0">
-                <a:solidFill>
-                  <a:srgbClr val="19BBD5"/>
-                </a:solidFill>
-              </a:rPr>
-              <a:t>cache</a:t>
-            </a:r>
-            <a:endParaRPr lang="de-DE" smtClean="0">
+              <a:t>strategy</a:t>
+            </a:r>
+            <a:endParaRPr lang="de-DE">
               <a:solidFill>
                 <a:srgbClr val="19BBD5"/>
               </a:solidFill>
@@ -21726,7 +21466,197 @@
                 <a:spcPts val="0"/>
               </a:spcBef>
             </a:pPr>
-            <a:endParaRPr lang="de-DE" smtClean="0"/>
+            <a:r>
+              <a:rPr lang="de-DE" err="1"/>
+              <a:t>Cached</a:t>
+            </a:r>
+            <a:r>
+              <a:rPr lang="de-DE"/>
+              <a:t> </a:t>
+            </a:r>
+            <a:r>
+              <a:rPr lang="de-DE" err="1"/>
+              <a:t>items</a:t>
+            </a:r>
+            <a:r>
+              <a:rPr lang="de-DE"/>
+              <a:t> must </a:t>
+            </a:r>
+            <a:r>
+              <a:rPr lang="de-DE" err="1"/>
+              <a:t>adhere</a:t>
+            </a:r>
+            <a:r>
+              <a:rPr lang="de-DE"/>
+              <a:t> </a:t>
+            </a:r>
+            <a:r>
+              <a:rPr lang="de-DE" err="1"/>
+              <a:t>to</a:t>
+            </a:r>
+            <a:r>
+              <a:rPr lang="de-DE"/>
+              <a:t> </a:t>
+            </a:r>
+            <a:r>
+              <a:rPr lang="de-DE" err="1"/>
+              <a:t>the</a:t>
+            </a:r>
+            <a:r>
+              <a:rPr lang="de-DE"/>
+              <a:t> 100kB </a:t>
+            </a:r>
+            <a:r>
+              <a:rPr lang="de-DE" err="1"/>
+              <a:t>size</a:t>
+            </a:r>
+            <a:r>
+              <a:rPr lang="de-DE"/>
+              <a:t> </a:t>
+            </a:r>
+            <a:r>
+              <a:rPr lang="de-DE" err="1"/>
+              <a:t>limits</a:t>
+            </a:r>
+            <a:br>
+              <a:rPr lang="de-DE"/>
+            </a:br>
+            <a:r>
+              <a:rPr lang="de-DE" err="1">
+                <a:solidFill>
+                  <a:srgbClr val="19BBD5"/>
+                </a:solidFill>
+              </a:rPr>
+              <a:t>Know</a:t>
+            </a:r>
+            <a:r>
+              <a:rPr lang="de-DE">
+                <a:solidFill>
+                  <a:srgbClr val="19BBD5"/>
+                </a:solidFill>
+              </a:rPr>
+              <a:t> </a:t>
+            </a:r>
+            <a:r>
+              <a:rPr lang="de-DE" err="1">
+                <a:solidFill>
+                  <a:srgbClr val="19BBD5"/>
+                </a:solidFill>
+              </a:rPr>
+              <a:t>what</a:t>
+            </a:r>
+            <a:r>
+              <a:rPr lang="de-DE">
+                <a:solidFill>
+                  <a:srgbClr val="19BBD5"/>
+                </a:solidFill>
+              </a:rPr>
+              <a:t> </a:t>
+            </a:r>
+            <a:r>
+              <a:rPr lang="de-DE" err="1">
+                <a:solidFill>
+                  <a:srgbClr val="19BBD5"/>
+                </a:solidFill>
+              </a:rPr>
+              <a:t>to</a:t>
+            </a:r>
+            <a:r>
+              <a:rPr lang="de-DE">
+                <a:solidFill>
+                  <a:srgbClr val="19BBD5"/>
+                </a:solidFill>
+              </a:rPr>
+              <a:t> </a:t>
+            </a:r>
+            <a:r>
+              <a:rPr lang="de-DE" err="1">
+                <a:solidFill>
+                  <a:srgbClr val="19BBD5"/>
+                </a:solidFill>
+              </a:rPr>
+              <a:t>cache</a:t>
+            </a:r>
+            <a:r>
+              <a:rPr lang="de-DE">
+                <a:solidFill>
+                  <a:srgbClr val="19BBD5"/>
+                </a:solidFill>
+              </a:rPr>
+              <a:t> </a:t>
+            </a:r>
+            <a:r>
+              <a:rPr lang="de-DE" err="1">
+                <a:solidFill>
+                  <a:srgbClr val="19BBD5"/>
+                </a:solidFill>
+              </a:rPr>
+              <a:t>and</a:t>
+            </a:r>
+            <a:r>
+              <a:rPr lang="de-DE">
+                <a:solidFill>
+                  <a:srgbClr val="19BBD5"/>
+                </a:solidFill>
+              </a:rPr>
+              <a:t> </a:t>
+            </a:r>
+            <a:r>
+              <a:rPr lang="de-DE" err="1">
+                <a:solidFill>
+                  <a:srgbClr val="19BBD5"/>
+                </a:solidFill>
+              </a:rPr>
+              <a:t>how</a:t>
+            </a:r>
+            <a:r>
+              <a:rPr lang="de-DE">
+                <a:solidFill>
+                  <a:srgbClr val="19BBD5"/>
+                </a:solidFill>
+              </a:rPr>
+              <a:t> </a:t>
+            </a:r>
+            <a:r>
+              <a:rPr lang="de-DE" err="1">
+                <a:solidFill>
+                  <a:srgbClr val="19BBD5"/>
+                </a:solidFill>
+              </a:rPr>
+              <a:t>to</a:t>
+            </a:r>
+            <a:r>
+              <a:rPr lang="de-DE">
+                <a:solidFill>
+                  <a:srgbClr val="19BBD5"/>
+                </a:solidFill>
+              </a:rPr>
+              <a:t> </a:t>
+            </a:r>
+            <a:r>
+              <a:rPr lang="de-DE" err="1">
+                <a:solidFill>
+                  <a:srgbClr val="19BBD5"/>
+                </a:solidFill>
+              </a:rPr>
+              <a:t>cache</a:t>
+            </a:r>
+            <a:endParaRPr lang="de-DE">
+              <a:solidFill>
+                <a:srgbClr val="19BBD5"/>
+              </a:solidFill>
+            </a:endParaRPr>
+          </a:p>
+          <a:p>
+            <a:pPr marL="457200" lvl="0" indent="-228600" rtl="0">
+              <a:lnSpc>
+                <a:spcPct val="150000"/>
+              </a:lnSpc>
+              <a:spcBef>
+                <a:spcPts val="0"/>
+              </a:spcBef>
+            </a:pPr>
+            <a:endParaRPr lang="de-DE"/>
           </a:p>
         </p:txBody>
       </p:sp>
@@ -21740,13 +21670,6 @@
   <p:clrMapOvr>
     <a:masterClrMapping/>
   </p:clrMapOvr>
-  <p:timing>
-    <p:tnLst>
-      <p:par>
-        <p:cTn id="1" dur="indefinite" restart="never" nodeType="tmRoot"/>
-      </p:par>
-    </p:tnLst>
-  </p:timing>
 </p:sld>
 </file>
 
@@ -21804,7 +21727,7 @@
               <a:buNone/>
             </a:pPr>
             <a:r>
-              <a:rPr lang="de-DE" b="1" smtClean="0">
+              <a:rPr lang="de-DE" b="1">
                 <a:solidFill>
                   <a:srgbClr val="C6DAEC"/>
                 </a:solidFill>
@@ -21816,7 +21739,7 @@
               <a:t>ORG: 24 </a:t>
             </a:r>
             <a:r>
-              <a:rPr lang="de-DE" b="1" err="1" smtClean="0">
+              <a:rPr lang="de-DE" b="1" err="1">
                 <a:solidFill>
                   <a:srgbClr val="C6DAEC"/>
                 </a:solidFill>
@@ -21827,7 +21750,7 @@
               </a:rPr>
               <a:t>hrs</a:t>
             </a:r>
-            <a:endParaRPr lang="de-DE" b="1" smtClean="0">
+            <a:endParaRPr lang="de-DE" b="1">
               <a:solidFill>
                 <a:srgbClr val="C6DAEC"/>
               </a:solidFill>
@@ -21844,7 +21767,7 @@
               </a:spcBef>
               <a:buNone/>
             </a:pPr>
-            <a:endParaRPr lang="de-DE" b="1" smtClean="0">
+            <a:endParaRPr lang="de-DE" b="1">
               <a:solidFill>
                 <a:srgbClr val="C6DAEC"/>
               </a:solidFill>
@@ -21862,7 +21785,7 @@
               <a:buNone/>
             </a:pPr>
             <a:r>
-              <a:rPr lang="de-DE" b="1" smtClean="0">
+              <a:rPr lang="de-DE" b="1">
                 <a:solidFill>
                   <a:srgbClr val="19BBD5"/>
                 </a:solidFill>
@@ -21942,15 +21865,15 @@
               <a:buNone/>
             </a:pPr>
             <a:r>
-              <a:rPr lang="de-DE" smtClean="0"/>
+              <a:rPr lang="de-DE"/>
               <a:t>Time-</a:t>
             </a:r>
             <a:r>
-              <a:rPr lang="de-DE" err="1" smtClean="0"/>
+              <a:rPr lang="de-DE" err="1"/>
               <a:t>to</a:t>
             </a:r>
             <a:r>
-              <a:rPr lang="de-DE" smtClean="0"/>
+              <a:rPr lang="de-DE"/>
               <a:t>-Live (TTL)</a:t>
             </a:r>
             <a:endParaRPr lang="en"/>
@@ -22003,7 +21926,7 @@
               <a:buNone/>
             </a:pPr>
             <a:r>
-              <a:rPr lang="de-DE" smtClean="0">
+              <a:rPr lang="de-DE">
                 <a:solidFill>
                   <a:srgbClr val="C6DAEC"/>
                 </a:solidFill>
@@ -22014,15 +21937,6 @@
               </a:rPr>
               <a:t>ORG: 5 min</a:t>
             </a:r>
-            <a:endParaRPr lang="de-DE" smtClean="0">
-              <a:solidFill>
-                <a:srgbClr val="C6DAEC"/>
-              </a:solidFill>
-              <a:latin typeface="Muli"/>
-              <a:ea typeface="Muli"/>
-              <a:cs typeface="Muli"/>
-              <a:sym typeface="Muli"/>
-            </a:endParaRPr>
           </a:p>
           <a:p>
             <a:pPr lvl="0" algn="ctr">
@@ -22049,7 +21963,7 @@
               <a:buNone/>
             </a:pPr>
             <a:r>
-              <a:rPr lang="de-DE" smtClean="0">
+              <a:rPr lang="de-DE">
                 <a:solidFill>
                   <a:srgbClr val="19BBD5"/>
                 </a:solidFill>
@@ -22086,7 +22000,7 @@
               <a:buNone/>
             </a:pPr>
             <a:r>
-              <a:rPr lang="de-DE" smtClean="0">
+              <a:rPr lang="de-DE">
                 <a:solidFill>
                   <a:srgbClr val="C6DAEC"/>
                 </a:solidFill>
@@ -22150,7 +22064,7 @@
               <a:buNone/>
             </a:pPr>
             <a:r>
-              <a:rPr lang="de-DE" smtClean="0">
+              <a:rPr lang="de-DE">
                 <a:solidFill>
                   <a:srgbClr val="C6DAEC"/>
                 </a:solidFill>
@@ -22162,7 +22076,7 @@
               <a:t>ORG: 48 </a:t>
             </a:r>
             <a:r>
-              <a:rPr lang="de-DE" err="1" smtClean="0">
+              <a:rPr lang="de-DE" err="1">
                 <a:solidFill>
                   <a:srgbClr val="C6DAEC"/>
                 </a:solidFill>
@@ -22173,7 +22087,7 @@
               </a:rPr>
               <a:t>hrs</a:t>
             </a:r>
-            <a:endParaRPr lang="de-DE" smtClean="0">
+            <a:endParaRPr lang="de-DE">
               <a:solidFill>
                 <a:srgbClr val="C6DAEC"/>
               </a:solidFill>
@@ -22182,43 +22096,6 @@
               <a:cs typeface="Muli"/>
               <a:sym typeface="Muli"/>
             </a:endParaRPr>
-          </a:p>
-          <a:p>
-            <a:pPr lvl="0" algn="ctr">
-              <a:spcBef>
-                <a:spcPts val="0"/>
-              </a:spcBef>
-              <a:buNone/>
-            </a:pPr>
-            <a:endParaRPr lang="de-DE" smtClean="0">
-              <a:solidFill>
-                <a:srgbClr val="C6DAEC"/>
-              </a:solidFill>
-              <a:latin typeface="Muli"/>
-              <a:ea typeface="Muli"/>
-              <a:cs typeface="Muli"/>
-              <a:sym typeface="Muli"/>
-            </a:endParaRPr>
-          </a:p>
-          <a:p>
-            <a:pPr lvl="0" algn="ctr">
-              <a:spcBef>
-                <a:spcPts val="0"/>
-              </a:spcBef>
-              <a:buNone/>
-            </a:pPr>
-            <a:r>
-              <a:rPr lang="de-DE" smtClean="0">
-                <a:solidFill>
-                  <a:srgbClr val="19BBD5"/>
-                </a:solidFill>
-                <a:latin typeface="Muli"/>
-                <a:ea typeface="Muli"/>
-                <a:cs typeface="Muli"/>
-                <a:sym typeface="Muli"/>
-              </a:rPr>
-              <a:t>MAXIMUM TTL</a:t>
-            </a:r>
           </a:p>
           <a:p>
             <a:pPr lvl="0" algn="ctr">
@@ -22245,7 +22122,44 @@
               <a:buNone/>
             </a:pPr>
             <a:r>
-              <a:rPr lang="de-DE" smtClean="0">
+              <a:rPr lang="de-DE">
+                <a:solidFill>
+                  <a:srgbClr val="19BBD5"/>
+                </a:solidFill>
+                <a:latin typeface="Muli"/>
+                <a:ea typeface="Muli"/>
+                <a:cs typeface="Muli"/>
+                <a:sym typeface="Muli"/>
+              </a:rPr>
+              <a:t>MAXIMUM TTL</a:t>
+            </a:r>
+          </a:p>
+          <a:p>
+            <a:pPr lvl="0" algn="ctr">
+              <a:spcBef>
+                <a:spcPts val="0"/>
+              </a:spcBef>
+              <a:buNone/>
+            </a:pPr>
+            <a:endParaRPr lang="de-DE">
+              <a:solidFill>
+                <a:srgbClr val="C6DAEC"/>
+              </a:solidFill>
+              <a:latin typeface="Muli"/>
+              <a:ea typeface="Muli"/>
+              <a:cs typeface="Muli"/>
+              <a:sym typeface="Muli"/>
+            </a:endParaRPr>
+          </a:p>
+          <a:p>
+            <a:pPr lvl="0" algn="ctr">
+              <a:spcBef>
+                <a:spcPts val="0"/>
+              </a:spcBef>
+              <a:buNone/>
+            </a:pPr>
+            <a:r>
+              <a:rPr lang="de-DE">
                 <a:solidFill>
                   <a:srgbClr val="C6DAEC"/>
                 </a:solidFill>
@@ -22257,7 +22171,7 @@
               <a:t>SESSION: 8 </a:t>
             </a:r>
             <a:r>
-              <a:rPr lang="de-DE" err="1" smtClean="0">
+              <a:rPr lang="de-DE" err="1">
                 <a:solidFill>
                   <a:srgbClr val="C6DAEC"/>
                 </a:solidFill>
@@ -22290,13 +22204,6 @@
   <p:clrMapOvr>
     <a:masterClrMapping/>
   </p:clrMapOvr>
-  <p:timing>
-    <p:tnLst>
-      <p:par>
-        <p:cTn id="1" dur="indefinite" restart="never" nodeType="tmRoot"/>
-      </p:par>
-    </p:tnLst>
-  </p:timing>
 </p:sld>
 </file>
 
@@ -22349,27 +22256,27 @@
               <a:buNone/>
             </a:pPr>
             <a:r>
-              <a:rPr lang="de-DE" smtClean="0"/>
+              <a:rPr lang="de-DE"/>
               <a:t>Cache </a:t>
             </a:r>
             <a:r>
-              <a:rPr lang="de-DE" err="1" smtClean="0"/>
+              <a:rPr lang="de-DE" err="1"/>
               <a:t>Rebuild</a:t>
             </a:r>
             <a:r>
-              <a:rPr lang="de-DE" smtClean="0"/>
+              <a:rPr lang="de-DE"/>
               <a:t> </a:t>
             </a:r>
             <a:r>
-              <a:rPr lang="de-DE" err="1" smtClean="0"/>
+              <a:rPr lang="de-DE" err="1"/>
               <a:t>and</a:t>
             </a:r>
             <a:r>
-              <a:rPr lang="de-DE" smtClean="0"/>
+              <a:rPr lang="de-DE"/>
               <a:t> </a:t>
             </a:r>
             <a:r>
-              <a:rPr lang="de-DE" err="1" smtClean="0"/>
+              <a:rPr lang="de-DE" err="1"/>
               <a:t>Fallback</a:t>
             </a:r>
             <a:endParaRPr lang="en"/>
@@ -22407,15 +22314,15 @@
               </a:spcBef>
             </a:pPr>
             <a:r>
-              <a:rPr lang="en-US" smtClean="0"/>
+              <a:rPr lang="en-US"/>
               <a:t>Use a </a:t>
             </a:r>
             <a:r>
-              <a:rPr lang="en-US" err="1" smtClean="0"/>
+              <a:rPr lang="en-US" err="1"/>
               <a:t>CacheManager</a:t>
             </a:r>
             <a:r>
-              <a:rPr lang="en-US" smtClean="0"/>
+              <a:rPr lang="en-US"/>
               <a:t> class</a:t>
             </a:r>
           </a:p>
@@ -22429,7 +22336,7 @@
               </a:spcBef>
             </a:pPr>
             <a:r>
-              <a:rPr lang="en-US" smtClean="0"/>
+              <a:rPr lang="en-US"/>
               <a:t>Schedule a cache rebuild</a:t>
             </a:r>
           </a:p>
@@ -22443,7 +22350,7 @@
               </a:spcBef>
             </a:pPr>
             <a:r>
-              <a:rPr lang="en-US" smtClean="0"/>
+              <a:rPr lang="en-US"/>
               <a:t>Trigger a rebuild when the cached objects change on disc</a:t>
             </a:r>
           </a:p>
@@ -22457,7 +22364,7 @@
               </a:spcBef>
             </a:pPr>
             <a:r>
-              <a:rPr lang="en-US" smtClean="0"/>
+              <a:rPr lang="en-US"/>
               <a:t>Wrap cache accessors in your own methods to catch misses and possible threads to your data</a:t>
             </a:r>
           </a:p>
@@ -22471,14 +22378,14 @@
               </a:spcBef>
             </a:pPr>
             <a:r>
-              <a:rPr lang="en-US" smtClean="0"/>
+              <a:rPr lang="en-US"/>
               <a:t>Use wrapper classes to reduce the overhead of cached </a:t>
             </a:r>
             <a:r>
-              <a:rPr lang="en-US" err="1" smtClean="0"/>
+              <a:rPr lang="en-US" err="1"/>
               <a:t>sObjects</a:t>
             </a:r>
-            <a:endParaRPr lang="en-US" smtClean="0"/>
+            <a:endParaRPr lang="en-US"/>
           </a:p>
         </p:txBody>
       </p:sp>
@@ -22492,13 +22399,6 @@
   <p:clrMapOvr>
     <a:masterClrMapping/>
   </p:clrMapOvr>
-  <p:timing>
-    <p:tnLst>
-      <p:par>
-        <p:cTn id="1" dur="indefinite" restart="never" nodeType="tmRoot"/>
-      </p:par>
-    </p:tnLst>
-  </p:timing>
 </p:sld>
 </file>
 
@@ -22551,7 +22451,7 @@
               <a:buNone/>
             </a:pPr>
             <a:r>
-              <a:rPr lang="de-DE" sz="3600" b="1" smtClean="0">
+              <a:rPr lang="de-DE" sz="3600" b="1">
                 <a:solidFill>
                   <a:srgbClr val="00E1C6"/>
                 </a:solidFill>
@@ -22563,7 +22463,7 @@
               <a:t>Size </a:t>
             </a:r>
             <a:r>
-              <a:rPr lang="de-DE" sz="3600" b="1" err="1" smtClean="0">
+              <a:rPr lang="de-DE" sz="3600" b="1" err="1">
                 <a:solidFill>
                   <a:srgbClr val="00E1C6"/>
                 </a:solidFill>
@@ -22575,7 +22475,7 @@
               <a:t>matters</a:t>
             </a:r>
             <a:r>
-              <a:rPr lang="de-DE" sz="3600" b="1" smtClean="0">
+              <a:rPr lang="de-DE" sz="3600" b="1">
                 <a:solidFill>
                   <a:srgbClr val="00E1C6"/>
                 </a:solidFill>
@@ -22587,7 +22487,7 @@
               <a:t> </a:t>
             </a:r>
             <a:r>
-              <a:rPr lang="mr-IN" sz="3600" b="1" smtClean="0">
+              <a:rPr lang="mr-IN" sz="3600" b="1">
                 <a:solidFill>
                   <a:srgbClr val="00E1C6"/>
                 </a:solidFill>
@@ -22599,7 +22499,7 @@
               <a:t>–</a:t>
             </a:r>
             <a:r>
-              <a:rPr lang="de-DE" sz="3600" b="1" smtClean="0">
+              <a:rPr lang="de-DE" sz="3600" b="1">
                 <a:solidFill>
                   <a:srgbClr val="00E1C6"/>
                 </a:solidFill>
@@ -22611,7 +22511,7 @@
               <a:t> 100kb </a:t>
             </a:r>
             <a:r>
-              <a:rPr lang="de-DE" sz="3600" b="1" err="1" smtClean="0">
+              <a:rPr lang="de-DE" sz="3600" b="1" err="1">
                 <a:solidFill>
                   <a:srgbClr val="00E1C6"/>
                 </a:solidFill>
@@ -22666,7 +22566,7 @@
               <a:buNone/>
             </a:pPr>
             <a:r>
-              <a:rPr lang="de-DE" sz="4800" b="1" smtClean="0">
+              <a:rPr lang="de-DE" sz="4800" b="1">
                 <a:solidFill>
                   <a:srgbClr val="3292E1"/>
                 </a:solidFill>
@@ -22678,7 +22578,7 @@
               <a:t>12.5k </a:t>
             </a:r>
             <a:r>
-              <a:rPr lang="de-DE" sz="4800" b="1" err="1" smtClean="0">
+              <a:rPr lang="de-DE" sz="4800" b="1" err="1">
                 <a:solidFill>
                   <a:srgbClr val="3292E1"/>
                 </a:solidFill>
@@ -22690,7 +22590,7 @@
               <a:t>wrapped</a:t>
             </a:r>
             <a:r>
-              <a:rPr lang="de-DE" sz="4800" b="1" smtClean="0">
+              <a:rPr lang="de-DE" sz="4800" b="1">
                 <a:solidFill>
                   <a:srgbClr val="3292E1"/>
                 </a:solidFill>
@@ -22702,7 +22602,7 @@
               <a:t> </a:t>
             </a:r>
             <a:r>
-              <a:rPr lang="de-DE" sz="4800" b="1" err="1" smtClean="0">
+              <a:rPr lang="de-DE" sz="4800" b="1" err="1">
                 <a:solidFill>
                   <a:srgbClr val="3292E1"/>
                 </a:solidFill>
@@ -22757,38 +22657,38 @@
               <a:buNone/>
             </a:pPr>
             <a:r>
-              <a:rPr lang="de-DE" smtClean="0"/>
+              <a:rPr lang="de-DE"/>
               <a:t>Same </a:t>
             </a:r>
             <a:r>
-              <a:rPr lang="de-DE" err="1" smtClean="0"/>
+              <a:rPr lang="de-DE" err="1"/>
               <a:t>query</a:t>
             </a:r>
             <a:r>
-              <a:rPr lang="de-DE" smtClean="0"/>
+              <a:rPr lang="de-DE"/>
               <a:t>, </a:t>
             </a:r>
             <a:r>
-              <a:rPr lang="de-DE" err="1" smtClean="0"/>
+              <a:rPr lang="de-DE" err="1"/>
               <a:t>using</a:t>
             </a:r>
             <a:r>
-              <a:rPr lang="de-DE" smtClean="0"/>
+              <a:rPr lang="de-DE"/>
               <a:t> a </a:t>
             </a:r>
             <a:r>
-              <a:rPr lang="de-DE" err="1" smtClean="0"/>
+              <a:rPr lang="de-DE" err="1"/>
               <a:t>wrapper</a:t>
             </a:r>
             <a:r>
-              <a:rPr lang="de-DE" smtClean="0"/>
+              <a:rPr lang="de-DE"/>
               <a:t> </a:t>
             </a:r>
             <a:r>
-              <a:rPr lang="de-DE" err="1" smtClean="0"/>
+              <a:rPr lang="de-DE" err="1"/>
               <a:t>class</a:t>
             </a:r>
-            <a:endParaRPr lang="de-DE" smtClean="0"/>
+            <a:endParaRPr lang="de-DE"/>
           </a:p>
           <a:p>
             <a:pPr lvl="0" algn="ctr" rtl="0">
@@ -22833,7 +22733,7 @@
               <a:buNone/>
             </a:pPr>
             <a:r>
-              <a:rPr lang="de-DE" sz="4800" b="1" dirty="0" smtClean="0">
+              <a:rPr lang="de-DE" sz="4800" b="1" dirty="0">
                 <a:latin typeface="Muli"/>
                 <a:ea typeface="Muli"/>
                 <a:cs typeface="Muli"/>
@@ -22842,7 +22742,7 @@
               <a:t>9k </a:t>
             </a:r>
             <a:r>
-              <a:rPr lang="de-DE" sz="4800" b="1" dirty="0" err="1" smtClean="0">
+              <a:rPr lang="de-DE" sz="4800" b="1" dirty="0" err="1">
                 <a:latin typeface="Muli"/>
                 <a:ea typeface="Muli"/>
                 <a:cs typeface="Muli"/>
@@ -22891,35 +22791,35 @@
               <a:buNone/>
             </a:pPr>
             <a:r>
-              <a:rPr lang="de-DE" smtClean="0"/>
+              <a:rPr lang="de-DE"/>
               <a:t>Product2 </a:t>
             </a:r>
             <a:r>
-              <a:rPr lang="de-DE" err="1" smtClean="0"/>
+              <a:rPr lang="de-DE" err="1"/>
               <a:t>records</a:t>
             </a:r>
             <a:r>
-              <a:rPr lang="de-DE" smtClean="0"/>
+              <a:rPr lang="de-DE"/>
               <a:t> </a:t>
             </a:r>
             <a:r>
-              <a:rPr lang="de-DE" err="1" smtClean="0"/>
+              <a:rPr lang="de-DE" err="1"/>
               <a:t>with</a:t>
             </a:r>
             <a:r>
-              <a:rPr lang="de-DE" smtClean="0"/>
+              <a:rPr lang="de-DE"/>
               <a:t> ID, Name, </a:t>
             </a:r>
             <a:r>
-              <a:rPr lang="de-DE" err="1" smtClean="0"/>
+              <a:rPr lang="de-DE" err="1"/>
               <a:t>ProductCode</a:t>
             </a:r>
             <a:r>
-              <a:rPr lang="de-DE" smtClean="0"/>
+              <a:rPr lang="de-DE"/>
               <a:t> </a:t>
             </a:r>
             <a:r>
-              <a:rPr lang="de-DE" err="1" smtClean="0"/>
+              <a:rPr lang="de-DE" err="1"/>
               <a:t>queried</a:t>
             </a:r>
             <a:endParaRPr lang="en"/>
@@ -22936,13 +22836,6 @@
   <p:clrMapOvr>
     <a:masterClrMapping/>
   </p:clrMapOvr>
-  <p:timing>
-    <p:tnLst>
-      <p:par>
-        <p:cTn id="1" dur="indefinite" restart="never" nodeType="tmRoot"/>
-      </p:par>
-    </p:tnLst>
-  </p:timing>
 </p:sld>
 </file>
 
@@ -22995,11 +22888,11 @@
               <a:buNone/>
             </a:pPr>
             <a:r>
-              <a:rPr lang="de-DE" dirty="0" err="1" smtClean="0"/>
+              <a:rPr lang="de-DE" dirty="0" err="1"/>
               <a:t>Example</a:t>
             </a:r>
             <a:r>
-              <a:rPr lang="de-DE" dirty="0" smtClean="0"/>
+              <a:rPr lang="de-DE" dirty="0"/>
               <a:t> / Demo</a:t>
             </a:r>
             <a:endParaRPr lang="en" dirty="0"/>
@@ -23040,15 +22933,15 @@
               </a:spcBef>
             </a:pPr>
             <a:r>
-              <a:rPr lang="en-US" smtClean="0"/>
+              <a:rPr lang="en-US"/>
               <a:t>Accounts relate to </a:t>
             </a:r>
             <a:r>
-              <a:rPr lang="en-US" err="1" smtClean="0"/>
+              <a:rPr lang="en-US" err="1"/>
               <a:t>SalesDistrict</a:t>
             </a:r>
             <a:r>
-              <a:rPr lang="en-US" smtClean="0"/>
+              <a:rPr lang="en-US"/>
               <a:t>__c</a:t>
             </a:r>
           </a:p>
@@ -23062,26 +22955,26 @@
               </a:spcBef>
             </a:pPr>
             <a:r>
-              <a:rPr lang="en-US" err="1" smtClean="0"/>
+              <a:rPr lang="en-US" err="1"/>
               <a:t>SalesDistrict</a:t>
             </a:r>
             <a:r>
-              <a:rPr lang="en-US" smtClean="0"/>
+              <a:rPr lang="en-US"/>
               <a:t>__c are assigned to Accounts by </a:t>
             </a:r>
             <a:r>
-              <a:rPr lang="en-US" err="1" smtClean="0"/>
+              <a:rPr lang="en-US" err="1"/>
               <a:t>CountryCode</a:t>
             </a:r>
             <a:r>
-              <a:rPr lang="en-US" smtClean="0"/>
+              <a:rPr lang="en-US"/>
               <a:t> and </a:t>
             </a:r>
             <a:r>
-              <a:rPr lang="en-US" err="1" smtClean="0"/>
+              <a:rPr lang="en-US" err="1"/>
               <a:t>PostalCode</a:t>
             </a:r>
-            <a:endParaRPr lang="en-US" smtClean="0"/>
+            <a:endParaRPr lang="en-US"/>
           </a:p>
           <a:p>
             <a:pPr marL="457200" lvl="0" indent="-228600" rtl="0">
@@ -23093,7 +22986,7 @@
               </a:spcBef>
             </a:pPr>
             <a:r>
-              <a:rPr lang="en-US" smtClean="0"/>
+              <a:rPr lang="en-US"/>
               <a:t>A default Sales District shall be used if no other can be found</a:t>
             </a:r>
           </a:p>
@@ -23117,13 +23010,6 @@
   <p:clrMapOvr>
     <a:masterClrMapping/>
   </p:clrMapOvr>
-  <p:timing>
-    <p:tnLst>
-      <p:par>
-        <p:cTn id="1" dur="indefinite" restart="never" nodeType="tmRoot"/>
-      </p:par>
-    </p:tnLst>
-  </p:timing>
 </p:sld>
 </file>
 
@@ -23176,7 +23062,7 @@
               <a:buNone/>
             </a:pPr>
             <a:r>
-              <a:rPr lang="de-DE" smtClean="0"/>
+              <a:rPr lang="de-DE"/>
               <a:t>Daniel Stange</a:t>
             </a:r>
             <a:endParaRPr lang="en"/>
@@ -23215,11 +23101,11 @@
               <a:buNone/>
             </a:pPr>
             <a:r>
-              <a:rPr lang="de-DE" sz="3600" b="1" smtClean="0"/>
+              <a:rPr lang="de-DE" sz="3600" b="1"/>
               <a:t>Technical </a:t>
             </a:r>
             <a:r>
-              <a:rPr lang="de-DE" sz="3600" b="1" err="1" smtClean="0"/>
+              <a:rPr lang="de-DE" sz="3600" b="1" err="1"/>
               <a:t>Architect</a:t>
             </a:r>
             <a:endParaRPr lang="en" sz="3600" b="1"/>
@@ -23232,7 +23118,7 @@
               <a:buNone/>
             </a:pPr>
             <a:r>
-              <a:rPr lang="de-DE" sz="2000" smtClean="0"/>
+              <a:rPr lang="de-DE" sz="2000"/>
               <a:t>die.interaktiven GmbH &amp; Co. KG</a:t>
             </a:r>
             <a:endParaRPr lang="en" sz="2000"/>
@@ -23245,19 +23131,11 @@
               <a:buNone/>
             </a:pPr>
             <a:r>
-              <a:rPr lang="en" smtClean="0"/>
-              <a:t>You </a:t>
-            </a:r>
-            <a:r>
               <a:rPr lang="en"/>
-              <a:t>can find me at </a:t>
-            </a:r>
-            <a:r>
-              <a:rPr lang="en" smtClean="0"/>
-              <a:t>@</a:t>
-            </a:r>
-            <a:r>
-              <a:rPr lang="de-DE" err="1" smtClean="0"/>
+              <a:t>You can find me at @</a:t>
+            </a:r>
+            <a:r>
+              <a:rPr lang="de-DE" err="1"/>
               <a:t>stangomat</a:t>
             </a:r>
             <a:endParaRPr lang="en"/>
@@ -23269,13 +23147,6 @@
   <p:clrMapOvr>
     <a:masterClrMapping/>
   </p:clrMapOvr>
-  <p:timing>
-    <p:tnLst>
-      <p:par>
-        <p:cTn id="1" dur="indefinite" restart="never" nodeType="tmRoot"/>
-      </p:par>
-    </p:tnLst>
-  </p:timing>
 </p:sld>
 </file>
 
@@ -23336,13 +23207,6 @@
   <p:clrMapOvr>
     <a:masterClrMapping/>
   </p:clrMapOvr>
-  <p:timing>
-    <p:tnLst>
-      <p:par>
-        <p:cTn id="1" dur="indefinite" restart="never" nodeType="tmRoot"/>
-      </p:par>
-    </p:tnLst>
-  </p:timing>
 </p:sld>
 </file>
 
@@ -23403,13 +23267,6 @@
   <p:clrMapOvr>
     <a:masterClrMapping/>
   </p:clrMapOvr>
-  <p:timing>
-    <p:tnLst>
-      <p:par>
-        <p:cTn id="1" dur="indefinite" restart="never" nodeType="tmRoot"/>
-      </p:par>
-    </p:tnLst>
-  </p:timing>
 </p:sld>
 </file>
 
@@ -24464,7 +24321,7 @@
               <a:buNone/>
             </a:pPr>
             <a:r>
-              <a:rPr lang="de-DE" b="1" dirty="0" err="1" smtClean="0">
+              <a:rPr lang="de-DE" b="1" dirty="0" err="1">
                 <a:solidFill>
                   <a:srgbClr val="19BBD5"/>
                 </a:solidFill>
@@ -24472,7 +24329,7 @@
               <a:t>Here‘s</a:t>
             </a:r>
             <a:r>
-              <a:rPr lang="de-DE" b="1" dirty="0" smtClean="0">
+              <a:rPr lang="de-DE" b="1" dirty="0">
                 <a:solidFill>
                   <a:srgbClr val="19BBD5"/>
                 </a:solidFill>
@@ -24480,7 +24337,7 @@
               <a:t> a Sample </a:t>
             </a:r>
             <a:r>
-              <a:rPr lang="de-DE" b="1" dirty="0" err="1" smtClean="0">
+              <a:rPr lang="de-DE" b="1" dirty="0" err="1">
                 <a:solidFill>
                   <a:srgbClr val="19BBD5"/>
                 </a:solidFill>
@@ -24488,7 +24345,7 @@
               <a:t>Sales</a:t>
             </a:r>
             <a:r>
-              <a:rPr lang="de-DE" b="1" dirty="0" smtClean="0">
+              <a:rPr lang="de-DE" b="1" dirty="0">
                 <a:solidFill>
                   <a:srgbClr val="19BBD5"/>
                 </a:solidFill>
@@ -24496,14 +24353,14 @@
               <a:t> </a:t>
             </a:r>
             <a:r>
-              <a:rPr lang="de-DE" b="1" dirty="0" err="1" smtClean="0">
+              <a:rPr lang="de-DE" b="1" dirty="0" err="1">
                 <a:solidFill>
                   <a:srgbClr val="19BBD5"/>
                 </a:solidFill>
               </a:rPr>
               <a:t>District</a:t>
             </a:r>
-            <a:endParaRPr lang="de-DE" b="1" dirty="0" smtClean="0">
+            <a:endParaRPr lang="de-DE" b="1" dirty="0">
               <a:solidFill>
                 <a:srgbClr val="19BBD5"/>
               </a:solidFill>
@@ -24518,7 +24375,7 @@
                 <a:spcPts val="0"/>
               </a:spcBef>
             </a:pPr>
-            <a:endParaRPr lang="en-US" sz="1600" dirty="0" smtClean="0">
+            <a:endParaRPr lang="en-US" sz="1600" dirty="0">
               <a:latin typeface="Muli" charset="0"/>
               <a:ea typeface="Muli" charset="0"/>
               <a:cs typeface="Muli" charset="0"/>
@@ -24534,7 +24391,7 @@
               </a:spcBef>
             </a:pPr>
             <a:r>
-              <a:rPr lang="en-US" sz="1600" dirty="0" smtClean="0">
+              <a:rPr lang="en-US" sz="1600" dirty="0">
                 <a:latin typeface="Muli" charset="0"/>
                 <a:ea typeface="Muli" charset="0"/>
                 <a:cs typeface="Muli" charset="0"/>
@@ -24542,7 +24399,7 @@
               <a:t>Everything with Country = DE and </a:t>
             </a:r>
             <a:r>
-              <a:rPr lang="en-US" sz="1600" dirty="0" err="1" smtClean="0">
+              <a:rPr lang="en-US" sz="1600" dirty="0" err="1">
                 <a:latin typeface="Muli" charset="0"/>
                 <a:ea typeface="Muli" charset="0"/>
                 <a:cs typeface="Muli" charset="0"/>
@@ -24550,28 +24407,12 @@
               <a:t>PostalCode</a:t>
             </a:r>
             <a:r>
-              <a:rPr lang="en-US" sz="1600" dirty="0" smtClean="0">
-                <a:latin typeface="Muli" charset="0"/>
-                <a:ea typeface="Muli" charset="0"/>
-                <a:cs typeface="Muli" charset="0"/>
-              </a:rPr>
-              <a:t> LIKE ‘45%’</a:t>
-            </a:r>
-            <a:r>
               <a:rPr lang="en-US" sz="1600" dirty="0">
                 <a:latin typeface="Muli" charset="0"/>
                 <a:ea typeface="Muli" charset="0"/>
                 <a:cs typeface="Muli" charset="0"/>
               </a:rPr>
-              <a:t> </a:t>
-            </a:r>
-            <a:r>
-              <a:rPr lang="en-US" sz="1600" dirty="0" smtClean="0">
-                <a:latin typeface="Muli" charset="0"/>
-                <a:ea typeface="Muli" charset="0"/>
-                <a:cs typeface="Muli" charset="0"/>
-              </a:rPr>
-              <a:t>should be assigned and have Nils as an Owner.</a:t>
+              <a:t> LIKE ‘45%’ should be assigned and have Nils as an Owner.</a:t>
             </a:r>
           </a:p>
         </p:txBody>
@@ -24616,13 +24457,6 @@
   <p:clrMapOvr>
     <a:masterClrMapping/>
   </p:clrMapOvr>
-  <p:timing>
-    <p:tnLst>
-      <p:par>
-        <p:cTn id="1" dur="indefinite" restart="never" nodeType="tmRoot"/>
-      </p:par>
-    </p:tnLst>
-  </p:timing>
 </p:sld>
 </file>
 
@@ -25677,7 +25511,7 @@
               <a:buNone/>
             </a:pPr>
             <a:r>
-              <a:rPr lang="de-DE" b="1" dirty="0" err="1" smtClean="0">
+              <a:rPr lang="de-DE" b="1" dirty="0" err="1">
                 <a:solidFill>
                   <a:srgbClr val="19BBD5"/>
                 </a:solidFill>
@@ -25685,7 +25519,7 @@
               <a:t>Creating</a:t>
             </a:r>
             <a:r>
-              <a:rPr lang="de-DE" b="1" dirty="0" smtClean="0">
+              <a:rPr lang="de-DE" b="1" dirty="0">
                 <a:solidFill>
                   <a:srgbClr val="19BBD5"/>
                 </a:solidFill>
@@ -25703,7 +25537,7 @@
               </a:spcBef>
             </a:pPr>
             <a:r>
-              <a:rPr lang="en-US" sz="1600" dirty="0" smtClean="0">
+              <a:rPr lang="en-US" sz="1600" dirty="0">
                 <a:latin typeface="Muli" charset="0"/>
                 <a:ea typeface="Muli" charset="0"/>
                 <a:cs typeface="Muli" charset="0"/>
@@ -25721,18 +25555,13 @@
               </a:spcBef>
             </a:pPr>
             <a:r>
-              <a:rPr lang="en-US" sz="1600" dirty="0" smtClean="0">
+              <a:rPr lang="en-US" sz="1600" dirty="0">
                 <a:latin typeface="Muli" charset="0"/>
                 <a:ea typeface="Muli" charset="0"/>
                 <a:cs typeface="Muli" charset="0"/>
               </a:rPr>
               <a:t>Should end up in Central Sample District being assigned</a:t>
             </a:r>
-            <a:endParaRPr lang="en-US" sz="1600" dirty="0">
-              <a:latin typeface="Muli" charset="0"/>
-              <a:ea typeface="Muli" charset="0"/>
-              <a:cs typeface="Muli" charset="0"/>
-            </a:endParaRPr>
           </a:p>
         </p:txBody>
       </p:sp>
@@ -25776,13 +25605,6 @@
   <p:clrMapOvr>
     <a:masterClrMapping/>
   </p:clrMapOvr>
-  <p:timing>
-    <p:tnLst>
-      <p:par>
-        <p:cTn id="1" dur="indefinite" restart="never" nodeType="tmRoot"/>
-      </p:par>
-    </p:tnLst>
-  </p:timing>
 </p:sld>
 </file>
 
@@ -26836,28 +26658,12 @@
               <a:buNone/>
             </a:pPr>
             <a:r>
-              <a:rPr lang="de-DE" sz="1800" b="1" dirty="0" err="1" smtClean="0">
+              <a:rPr lang="de-DE" sz="1800" b="1" dirty="0" err="1">
                 <a:solidFill>
                   <a:srgbClr val="19BBD5"/>
                 </a:solidFill>
               </a:rPr>
               <a:t>And</a:t>
-            </a:r>
-            <a:r>
-              <a:rPr lang="de-DE" sz="1800" b="1" dirty="0" smtClean="0">
-                <a:solidFill>
-                  <a:srgbClr val="19BBD5"/>
-                </a:solidFill>
-              </a:rPr>
-              <a:t> </a:t>
-            </a:r>
-            <a:r>
-              <a:rPr lang="de-DE" sz="1800" b="1" dirty="0" err="1" smtClean="0">
-                <a:solidFill>
-                  <a:srgbClr val="19BBD5"/>
-                </a:solidFill>
-              </a:rPr>
-              <a:t>there</a:t>
             </a:r>
             <a:r>
               <a:rPr lang="de-DE" sz="1800" b="1" dirty="0">
@@ -26868,7 +26674,23 @@
               <a:t> </a:t>
             </a:r>
             <a:r>
-              <a:rPr lang="de-DE" sz="1800" b="1" dirty="0" err="1" smtClean="0">
+              <a:rPr lang="de-DE" sz="1800" b="1" dirty="0" err="1">
+                <a:solidFill>
+                  <a:srgbClr val="19BBD5"/>
+                </a:solidFill>
+              </a:rPr>
+              <a:t>there</a:t>
+            </a:r>
+            <a:r>
+              <a:rPr lang="de-DE" sz="1800" b="1" dirty="0">
+                <a:solidFill>
+                  <a:srgbClr val="19BBD5"/>
+                </a:solidFill>
+              </a:rPr>
+              <a:t> </a:t>
+            </a:r>
+            <a:r>
+              <a:rPr lang="de-DE" sz="1800" b="1" dirty="0" err="1">
                 <a:solidFill>
                   <a:srgbClr val="19BBD5"/>
                 </a:solidFill>
@@ -26876,7 +26698,7 @@
               <a:t>it</a:t>
             </a:r>
             <a:r>
-              <a:rPr lang="de-DE" sz="1800" b="1" dirty="0" smtClean="0">
+              <a:rPr lang="de-DE" sz="1800" b="1" dirty="0">
                 <a:solidFill>
                   <a:srgbClr val="19BBD5"/>
                 </a:solidFill>
@@ -26884,7 +26706,7 @@
               <a:t> </a:t>
             </a:r>
             <a:r>
-              <a:rPr lang="de-DE" sz="1800" b="1" dirty="0" err="1" smtClean="0">
+              <a:rPr lang="de-DE" sz="1800" b="1" dirty="0" err="1">
                 <a:solidFill>
                   <a:srgbClr val="19BBD5"/>
                 </a:solidFill>
@@ -26892,18 +26714,13 @@
               <a:t>is</a:t>
             </a:r>
             <a:r>
-              <a:rPr lang="de-DE" sz="1800" b="1" dirty="0" smtClean="0">
+              <a:rPr lang="de-DE" sz="1800" b="1" dirty="0">
                 <a:solidFill>
                   <a:srgbClr val="19BBD5"/>
                 </a:solidFill>
               </a:rPr>
               <a:t>!</a:t>
             </a:r>
-            <a:endParaRPr lang="de-DE" sz="1800" b="1" dirty="0">
-              <a:solidFill>
-                <a:srgbClr val="19BBD5"/>
-              </a:solidFill>
-            </a:endParaRPr>
           </a:p>
         </p:txBody>
       </p:sp>
@@ -26946,13 +26763,6 @@
   <p:clrMapOvr>
     <a:masterClrMapping/>
   </p:clrMapOvr>
-  <p:timing>
-    <p:tnLst>
-      <p:par>
-        <p:cTn id="1" dur="indefinite" restart="never" nodeType="tmRoot"/>
-      </p:par>
-    </p:tnLst>
-  </p:timing>
 </p:sld>
 </file>
 
@@ -27005,19 +26815,19 @@
               <a:buNone/>
             </a:pPr>
             <a:r>
-              <a:rPr lang="de-DE" smtClean="0"/>
+              <a:rPr lang="de-DE"/>
               <a:t>Things </a:t>
             </a:r>
             <a:r>
-              <a:rPr lang="de-DE" err="1" smtClean="0"/>
+              <a:rPr lang="de-DE" err="1"/>
               <a:t>to</a:t>
             </a:r>
             <a:r>
-              <a:rPr lang="de-DE" smtClean="0"/>
+              <a:rPr lang="de-DE"/>
               <a:t> </a:t>
             </a:r>
             <a:r>
-              <a:rPr lang="de-DE" err="1" smtClean="0"/>
+              <a:rPr lang="de-DE" err="1"/>
               <a:t>consider</a:t>
             </a:r>
             <a:endParaRPr lang="en"/>
@@ -27058,7 +26868,7 @@
               </a:spcBef>
             </a:pPr>
             <a:r>
-              <a:rPr lang="en-US" smtClean="0"/>
+              <a:rPr lang="en-US"/>
               <a:t>Don‘t use the cache as a fast, limit-free database.</a:t>
             </a:r>
           </a:p>
@@ -27072,7 +26882,7 @@
               </a:spcBef>
             </a:pPr>
             <a:r>
-              <a:rPr lang="en-US" smtClean="0"/>
+              <a:rPr lang="en-US"/>
               <a:t>Don‘t use it as temporary storage for business objects</a:t>
             </a:r>
           </a:p>
@@ -27086,7 +26896,7 @@
               </a:spcBef>
             </a:pPr>
             <a:r>
-              <a:rPr lang="en-US" smtClean="0"/>
+              <a:rPr lang="en-US"/>
               <a:t>No items larger than 100kB</a:t>
             </a:r>
           </a:p>
@@ -27100,7 +26910,7 @@
               </a:spcBef>
             </a:pPr>
             <a:r>
-              <a:rPr lang="en-US" smtClean="0"/>
+              <a:rPr lang="en-US"/>
               <a:t>Cached Items are not persisted – don‘t rely on them being there.</a:t>
             </a:r>
           </a:p>
@@ -27114,7 +26924,7 @@
               </a:spcBef>
             </a:pPr>
             <a:r>
-              <a:rPr lang="en-US" smtClean="0"/>
+              <a:rPr lang="en-US"/>
               <a:t>Don‘t rely on cached items to be the same as those you put into the cache</a:t>
             </a:r>
           </a:p>
@@ -27130,13 +26940,6 @@
   <p:clrMapOvr>
     <a:masterClrMapping/>
   </p:clrMapOvr>
-  <p:timing>
-    <p:tnLst>
-      <p:par>
-        <p:cTn id="1" dur="indefinite" restart="never" nodeType="tmRoot"/>
-      </p:par>
-    </p:tnLst>
-  </p:timing>
 </p:sld>
 </file>
 
@@ -27194,7 +26997,7 @@
               <a:buNone/>
             </a:pPr>
             <a:r>
-              <a:rPr lang="de-DE" b="1" err="1" smtClean="0">
+              <a:rPr lang="de-DE" b="1" err="1">
                 <a:solidFill>
                   <a:srgbClr val="C6DAEC"/>
                 </a:solidFill>
@@ -27206,7 +27009,7 @@
               <a:t>Org.Cache</a:t>
             </a:r>
             <a:r>
-              <a:rPr lang="de-DE" b="1" smtClean="0">
+              <a:rPr lang="de-DE" b="1">
                 <a:solidFill>
                   <a:srgbClr val="C6DAEC"/>
                 </a:solidFill>
@@ -27217,7 +27020,15 @@
               </a:rPr>
               <a:t>-Default Partition</a:t>
             </a:r>
-            <a:endParaRPr lang="de-DE" b="1" smtClean="0">
+          </a:p>
+          <a:p>
+            <a:pPr lvl="0" algn="ctr">
+              <a:spcBef>
+                <a:spcPts val="0"/>
+              </a:spcBef>
+              <a:buNone/>
+            </a:pPr>
+            <a:endParaRPr lang="de-DE" b="1">
               <a:solidFill>
                 <a:srgbClr val="C6DAEC"/>
               </a:solidFill>
@@ -27234,25 +27045,8 @@
               </a:spcBef>
               <a:buNone/>
             </a:pPr>
-            <a:endParaRPr lang="de-DE" b="1" smtClean="0">
-              <a:solidFill>
-                <a:srgbClr val="C6DAEC"/>
-              </a:solidFill>
-              <a:latin typeface="Muli"/>
-              <a:ea typeface="Muli"/>
-              <a:cs typeface="Muli"/>
-              <a:sym typeface="Muli"/>
-            </a:endParaRPr>
-          </a:p>
-          <a:p>
-            <a:pPr lvl="0" algn="ctr">
-              <a:spcBef>
-                <a:spcPts val="0"/>
-              </a:spcBef>
-              <a:buNone/>
-            </a:pPr>
-            <a:r>
-              <a:rPr lang="de-DE" b="1" smtClean="0">
+            <a:r>
+              <a:rPr lang="de-DE" b="1">
                 <a:solidFill>
                   <a:srgbClr val="C6DAEC"/>
                 </a:solidFill>
@@ -27263,15 +27057,6 @@
               </a:rPr>
               <a:t>Products</a:t>
             </a:r>
-            <a:endParaRPr lang="de-DE" b="1">
-              <a:solidFill>
-                <a:srgbClr val="C6DAEC"/>
-              </a:solidFill>
-              <a:latin typeface="Muli"/>
-              <a:ea typeface="Muli"/>
-              <a:cs typeface="Muli"/>
-              <a:sym typeface="Muli"/>
-            </a:endParaRPr>
           </a:p>
           <a:p>
             <a:pPr lvl="0" algn="ctr">
@@ -27338,7 +27123,7 @@
               <a:buNone/>
             </a:pPr>
             <a:r>
-              <a:rPr lang="de-DE" b="1" dirty="0" smtClean="0">
+              <a:rPr lang="de-DE" b="1" dirty="0">
                 <a:solidFill>
                   <a:srgbClr val="19BBD5"/>
                 </a:solidFill>
@@ -27358,7 +27143,7 @@
               <a:buNone/>
             </a:pPr>
             <a:r>
-              <a:rPr lang="de-DE" dirty="0" err="1" smtClean="0">
+              <a:rPr lang="de-DE" dirty="0" err="1">
                 <a:solidFill>
                   <a:srgbClr val="C6DAEC"/>
                 </a:solidFill>
@@ -27370,18 +27155,6 @@
               <a:t>Org.Cache.put</a:t>
             </a:r>
             <a:r>
-              <a:rPr lang="de-DE" dirty="0" smtClean="0">
-                <a:solidFill>
-                  <a:srgbClr val="C6DAEC"/>
-                </a:solidFill>
-                <a:latin typeface="Muli"/>
-                <a:ea typeface="Muli"/>
-                <a:cs typeface="Muli"/>
-                <a:sym typeface="Muli"/>
-              </a:rPr>
-              <a:t>(’</a:t>
-            </a:r>
-            <a:r>
               <a:rPr lang="de-DE" dirty="0">
                 <a:solidFill>
                   <a:srgbClr val="C6DAEC"/>
@@ -27391,22 +27164,10 @@
                 <a:cs typeface="Muli"/>
                 <a:sym typeface="Muli"/>
               </a:rPr>
-              <a:t>P</a:t>
-            </a:r>
-            <a:r>
-              <a:rPr lang="de-DE" dirty="0" smtClean="0">
-                <a:solidFill>
-                  <a:srgbClr val="C6DAEC"/>
-                </a:solidFill>
-                <a:latin typeface="Muli"/>
-                <a:ea typeface="Muli"/>
-                <a:cs typeface="Muli"/>
-                <a:sym typeface="Muli"/>
-              </a:rPr>
-              <a:t>roducts‘,</a:t>
+              <a:t>(’Products‘,</a:t>
             </a:r>
             <a:br>
-              <a:rPr lang="de-DE" dirty="0" smtClean="0">
+              <a:rPr lang="de-DE" dirty="0">
                 <a:solidFill>
                   <a:srgbClr val="C6DAEC"/>
                 </a:solidFill>
@@ -27417,7 +27178,7 @@
               </a:rPr>
             </a:br>
             <a:r>
-              <a:rPr lang="de-DE" dirty="0" smtClean="0">
+              <a:rPr lang="de-DE" dirty="0">
                 <a:solidFill>
                   <a:srgbClr val="C6DAEC"/>
                 </a:solidFill>
@@ -27429,7 +27190,7 @@
               <a:t>‘</a:t>
             </a:r>
             <a:r>
-              <a:rPr lang="de-DE" dirty="0" err="1" smtClean="0">
+              <a:rPr lang="de-DE" dirty="0" err="1">
                 <a:solidFill>
                   <a:srgbClr val="C6DAEC"/>
                 </a:solidFill>
@@ -27441,7 +27202,7 @@
               <a:t>Banana</a:t>
             </a:r>
             <a:r>
-              <a:rPr lang="de-DE" dirty="0" smtClean="0">
+              <a:rPr lang="de-DE" dirty="0">
                 <a:solidFill>
                   <a:srgbClr val="C6DAEC"/>
                 </a:solidFill>
@@ -27505,7 +27266,7 @@
               <a:buNone/>
             </a:pPr>
             <a:r>
-              <a:rPr lang="de-DE" b="1" dirty="0" err="1" smtClean="0">
+              <a:rPr lang="de-DE" b="1" dirty="0" err="1">
                 <a:solidFill>
                   <a:srgbClr val="19BBD5"/>
                 </a:solidFill>
@@ -27517,7 +27278,7 @@
               <a:t>Scheduled</a:t>
             </a:r>
             <a:r>
-              <a:rPr lang="de-DE" b="1" dirty="0" smtClean="0">
+              <a:rPr lang="de-DE" b="1" dirty="0">
                 <a:solidFill>
                   <a:srgbClr val="19BBD5"/>
                 </a:solidFill>
@@ -27537,7 +27298,7 @@
               <a:buNone/>
             </a:pPr>
             <a:r>
-              <a:rPr lang="de-DE" dirty="0" err="1" smtClean="0">
+              <a:rPr lang="de-DE" dirty="0" err="1">
                 <a:solidFill>
                   <a:srgbClr val="C6DAEC"/>
                 </a:solidFill>
@@ -27548,20 +27309,8 @@
               </a:rPr>
               <a:t>Org.Cache.put</a:t>
             </a:r>
-            <a:r>
-              <a:rPr lang="de-DE" dirty="0" smtClean="0">
-                <a:solidFill>
-                  <a:srgbClr val="C6DAEC"/>
-                </a:solidFill>
-                <a:latin typeface="Muli"/>
-                <a:ea typeface="Muli"/>
-                <a:cs typeface="Muli"/>
-                <a:sym typeface="Muli"/>
-              </a:rPr>
-              <a:t/>
-            </a:r>
             <a:br>
-              <a:rPr lang="de-DE" dirty="0" smtClean="0">
+              <a:rPr lang="de-DE" dirty="0">
                 <a:solidFill>
                   <a:srgbClr val="C6DAEC"/>
                 </a:solidFill>
@@ -27572,7 +27321,7 @@
               </a:rPr>
             </a:br>
             <a:r>
-              <a:rPr lang="de-DE" dirty="0" smtClean="0">
+              <a:rPr lang="de-DE" dirty="0">
                 <a:solidFill>
                   <a:srgbClr val="C6DAEC"/>
                 </a:solidFill>
@@ -27636,7 +27385,7 @@
               <a:buNone/>
             </a:pPr>
             <a:r>
-              <a:rPr lang="de-DE" b="1" dirty="0" smtClean="0">
+              <a:rPr lang="de-DE" b="1" dirty="0">
                 <a:solidFill>
                   <a:srgbClr val="19BBD5"/>
                 </a:solidFill>
@@ -27647,20 +27396,8 @@
               </a:rPr>
               <a:t>User 2</a:t>
             </a:r>
-            <a:r>
-              <a:rPr lang="de-DE" dirty="0" smtClean="0">
-                <a:solidFill>
-                  <a:srgbClr val="C6DAEC"/>
-                </a:solidFill>
-                <a:latin typeface="Muli"/>
-                <a:ea typeface="Muli"/>
-                <a:cs typeface="Muli"/>
-                <a:sym typeface="Muli"/>
-              </a:rPr>
-              <a:t/>
-            </a:r>
             <a:br>
-              <a:rPr lang="de-DE" dirty="0" smtClean="0">
+              <a:rPr lang="de-DE" dirty="0">
                 <a:solidFill>
                   <a:srgbClr val="C6DAEC"/>
                 </a:solidFill>
@@ -27671,7 +27408,7 @@
               </a:rPr>
             </a:br>
             <a:r>
-              <a:rPr lang="de-DE" dirty="0" err="1" smtClean="0">
+              <a:rPr lang="de-DE" dirty="0" err="1">
                 <a:solidFill>
                   <a:srgbClr val="C6DAEC"/>
                 </a:solidFill>
@@ -27683,7 +27420,7 @@
               <a:t>Org.Cache.put</a:t>
             </a:r>
             <a:r>
-              <a:rPr lang="de-DE" dirty="0" smtClean="0">
+              <a:rPr lang="de-DE" dirty="0">
                 <a:solidFill>
                   <a:srgbClr val="C6DAEC"/>
                 </a:solidFill>
@@ -27695,7 +27432,7 @@
               <a:t>(‘Products’, </a:t>
             </a:r>
             <a:r>
-              <a:rPr lang="de-DE" dirty="0" err="1" smtClean="0">
+              <a:rPr lang="de-DE" dirty="0" err="1">
                 <a:solidFill>
                   <a:srgbClr val="C6DAEC"/>
                 </a:solidFill>
@@ -27707,7 +27444,7 @@
               <a:t>some</a:t>
             </a:r>
             <a:r>
-              <a:rPr lang="de-DE" dirty="0" smtClean="0">
+              <a:rPr lang="de-DE" dirty="0">
                 <a:solidFill>
                   <a:srgbClr val="C6DAEC"/>
                 </a:solidFill>
@@ -27719,7 +27456,7 @@
               <a:t> </a:t>
             </a:r>
             <a:r>
-              <a:rPr lang="de-DE" dirty="0" err="1" smtClean="0">
+              <a:rPr lang="de-DE" dirty="0" err="1">
                 <a:solidFill>
                   <a:srgbClr val="C6DAEC"/>
                 </a:solidFill>
@@ -27731,7 +27468,7 @@
               <a:t>Map</a:t>
             </a:r>
             <a:r>
-              <a:rPr lang="de-DE" dirty="0" smtClean="0">
+              <a:rPr lang="de-DE" dirty="0">
                 <a:solidFill>
                   <a:srgbClr val="C6DAEC"/>
                 </a:solidFill>
@@ -27743,7 +27480,7 @@
               <a:t>&lt;</a:t>
             </a:r>
             <a:r>
-              <a:rPr lang="de-DE" dirty="0" err="1" smtClean="0">
+              <a:rPr lang="de-DE" dirty="0" err="1">
                 <a:solidFill>
                   <a:srgbClr val="C6DAEC"/>
                 </a:solidFill>
@@ -27755,7 +27492,7 @@
               <a:t>Id</a:t>
             </a:r>
             <a:r>
-              <a:rPr lang="de-DE" dirty="0" smtClean="0">
+              <a:rPr lang="de-DE" dirty="0">
                 <a:solidFill>
                   <a:srgbClr val="C6DAEC"/>
                 </a:solidFill>
@@ -27805,7 +27542,7 @@
               </a:lnSpc>
             </a:pPr>
             <a:r>
-              <a:rPr lang="en-US" sz="2800" smtClean="0">
+              <a:rPr lang="en-US" sz="2800">
                 <a:solidFill>
                   <a:srgbClr val="19BBD5"/>
                 </a:solidFill>
@@ -27816,7 +27553,7 @@
               <a:t>Why you </a:t>
             </a:r>
             <a:br>
-              <a:rPr lang="en-US" sz="2800" smtClean="0">
+              <a:rPr lang="en-US" sz="2800">
                 <a:solidFill>
                   <a:srgbClr val="19BBD5"/>
                 </a:solidFill>
@@ -27826,7 +27563,7 @@
               </a:rPr>
             </a:br>
             <a:r>
-              <a:rPr lang="en-US" sz="2800" smtClean="0">
+              <a:rPr lang="en-US" sz="2800">
                 <a:solidFill>
                   <a:srgbClr val="19BBD5"/>
                 </a:solidFill>
@@ -27837,7 +27574,7 @@
               <a:t>shouldn’t trust </a:t>
             </a:r>
             <a:br>
-              <a:rPr lang="en-US" sz="2800" smtClean="0">
+              <a:rPr lang="en-US" sz="2800">
                 <a:solidFill>
                   <a:srgbClr val="19BBD5"/>
                 </a:solidFill>
@@ -27847,7 +27584,7 @@
               </a:rPr>
             </a:br>
             <a:r>
-              <a:rPr lang="en-US" sz="2800" smtClean="0">
+              <a:rPr lang="en-US" sz="2800">
                 <a:solidFill>
                   <a:srgbClr val="19BBD5"/>
                 </a:solidFill>
@@ -27858,7 +27595,7 @@
               <a:t>the cache</a:t>
             </a:r>
             <a:r>
-              <a:rPr lang="mr-IN" sz="2800" smtClean="0">
+              <a:rPr lang="mr-IN" sz="2800">
                 <a:solidFill>
                   <a:srgbClr val="19BBD5"/>
                 </a:solidFill>
@@ -27884,13 +27621,6 @@
   <p:clrMapOvr>
     <a:masterClrMapping/>
   </p:clrMapOvr>
-  <p:timing>
-    <p:tnLst>
-      <p:par>
-        <p:cTn id="1" dur="indefinite" restart="never" nodeType="tmRoot"/>
-      </p:par>
-    </p:tnLst>
-  </p:timing>
 </p:sld>
 </file>
 
@@ -27943,7 +27673,7 @@
               <a:buNone/>
             </a:pPr>
             <a:r>
-              <a:rPr lang="de-DE" smtClean="0"/>
+              <a:rPr lang="de-DE"/>
               <a:t>Best Practices</a:t>
             </a:r>
             <a:endParaRPr lang="en"/>
@@ -27984,7 +27714,7 @@
               </a:spcBef>
             </a:pPr>
             <a:r>
-              <a:rPr lang="en-US" smtClean="0"/>
+              <a:rPr lang="en-US"/>
               <a:t>Usually, it‘s better to cache lists or maps of objects</a:t>
             </a:r>
           </a:p>
@@ -27998,7 +27728,7 @@
               </a:spcBef>
             </a:pPr>
             <a:r>
-              <a:rPr lang="en-US" smtClean="0"/>
+              <a:rPr lang="en-US"/>
               <a:t>Better performance of fewer, larger operations vs. 100kB item size limit</a:t>
             </a:r>
           </a:p>
@@ -28012,18 +27742,17 @@
               </a:spcBef>
             </a:pPr>
             <a:r>
-              <a:rPr lang="en-US" smtClean="0"/>
+              <a:rPr lang="en-US"/>
               <a:t>Use a wrapper class to reduce </a:t>
             </a:r>
             <a:r>
-              <a:rPr lang="en-US" err="1" smtClean="0"/>
+              <a:rPr lang="en-US" err="1"/>
               <a:t>sObject</a:t>
             </a:r>
             <a:r>
-              <a:rPr lang="en-US" smtClean="0"/>
+              <a:rPr lang="en-US"/>
               <a:t> overhead</a:t>
             </a:r>
-            <a:endParaRPr lang="en-US" smtClean="0"/>
           </a:p>
           <a:p>
             <a:pPr marL="457200" lvl="0" indent="-228600" rtl="0">
@@ -28035,7 +27764,7 @@
               </a:spcBef>
             </a:pPr>
             <a:r>
-              <a:rPr lang="en-US" smtClean="0"/>
+              <a:rPr lang="en-US"/>
               <a:t>Use the fully qualified name of your cache partition</a:t>
             </a:r>
           </a:p>
@@ -28049,7 +27778,7 @@
               </a:spcBef>
             </a:pPr>
             <a:r>
-              <a:rPr lang="en-US" smtClean="0"/>
+              <a:rPr lang="en-US"/>
               <a:t>Consider using the ‘immutable‘ flag</a:t>
             </a:r>
           </a:p>
@@ -28063,10 +27792,9 @@
               </a:spcBef>
             </a:pPr>
             <a:r>
-              <a:rPr lang="en-US" smtClean="0"/>
+              <a:rPr lang="en-US"/>
               <a:t>Again: Careful when storing business objects </a:t>
             </a:r>
-            <a:endParaRPr lang="en-US" smtClean="0"/>
           </a:p>
         </p:txBody>
       </p:sp>
@@ -28080,13 +27808,6 @@
   <p:clrMapOvr>
     <a:masterClrMapping/>
   </p:clrMapOvr>
-  <p:timing>
-    <p:tnLst>
-      <p:par>
-        <p:cTn id="1" dur="indefinite" restart="never" nodeType="tmRoot"/>
-      </p:par>
-    </p:tnLst>
-  </p:timing>
 </p:sld>
 </file>
 
@@ -28139,7 +27860,7 @@
               <a:buNone/>
             </a:pPr>
             <a:r>
-              <a:rPr lang="de-DE" smtClean="0">
+              <a:rPr lang="de-DE">
                 <a:solidFill>
                   <a:srgbClr val="19BBD5"/>
                 </a:solidFill>
@@ -28189,7 +27910,7 @@
               <a:buSzPct val="100000"/>
             </a:pPr>
             <a:r>
-              <a:rPr lang="de-DE" smtClean="0">
+              <a:rPr lang="de-DE" dirty="0">
                 <a:solidFill>
                   <a:srgbClr val="19BBD5"/>
                 </a:solidFill>
@@ -28197,7 +27918,7 @@
               <a:t>Developer </a:t>
             </a:r>
             <a:r>
-              <a:rPr lang="de-DE" err="1" smtClean="0">
+              <a:rPr lang="de-DE" dirty="0" err="1">
                 <a:solidFill>
                   <a:srgbClr val="19BBD5"/>
                 </a:solidFill>
@@ -28205,7 +27926,7 @@
               <a:t>Documentation</a:t>
             </a:r>
             <a:r>
-              <a:rPr lang="de-DE" smtClean="0">
+              <a:rPr lang="de-DE" dirty="0">
                 <a:solidFill>
                   <a:srgbClr val="19BBD5"/>
                 </a:solidFill>
@@ -28213,25 +27934,18 @@
               <a:t>: </a:t>
             </a:r>
             <a:r>
-              <a:rPr lang="de-DE"/>
-              <a:t/>
-            </a:r>
-            <a:br>
-              <a:rPr lang="de-DE"/>
-            </a:br>
-            <a:r>
-              <a:rPr lang="de-DE" err="1" smtClean="0"/>
+              <a:rPr lang="de-DE" dirty="0" err="1"/>
               <a:t>bit.ly</a:t>
             </a:r>
             <a:r>
-              <a:rPr lang="de-DE" smtClean="0"/>
+              <a:rPr lang="de-DE" dirty="0"/>
               <a:t>/</a:t>
             </a:r>
             <a:r>
-              <a:rPr lang="de-DE" err="1" smtClean="0"/>
+              <a:rPr lang="de-DE" dirty="0" err="1"/>
               <a:t>cachedoc</a:t>
             </a:r>
-            <a:endParaRPr lang="de-DE" smtClean="0"/>
+            <a:endParaRPr lang="de-DE" dirty="0"/>
           </a:p>
           <a:p>
             <a:pPr marL="457200" lvl="0" indent="-304800">
@@ -28244,7 +27958,7 @@
               <a:buSzPct val="100000"/>
             </a:pPr>
             <a:r>
-              <a:rPr lang="de-DE" err="1" smtClean="0">
+              <a:rPr lang="de-DE" dirty="0" err="1">
                 <a:solidFill>
                   <a:srgbClr val="19BBD5"/>
                 </a:solidFill>
@@ -28252,7 +27966,7 @@
               <a:t>Trailhead</a:t>
             </a:r>
             <a:r>
-              <a:rPr lang="de-DE" smtClean="0">
+              <a:rPr lang="de-DE" dirty="0">
                 <a:solidFill>
                   <a:srgbClr val="19BBD5"/>
                 </a:solidFill>
@@ -28260,7 +27974,7 @@
               <a:t>: </a:t>
             </a:r>
             <a:r>
-              <a:rPr lang="de-DE" err="1" smtClean="0">
+              <a:rPr lang="de-DE" dirty="0" err="1">
                 <a:solidFill>
                   <a:srgbClr val="19BBD5"/>
                 </a:solidFill>
@@ -28268,57 +27982,26 @@
               <a:t>Platform</a:t>
             </a:r>
             <a:r>
-              <a:rPr lang="de-DE" smtClean="0">
+              <a:rPr lang="de-DE" dirty="0">
                 <a:solidFill>
                   <a:srgbClr val="19BBD5"/>
                 </a:solidFill>
               </a:rPr>
-              <a:t> </a:t>
-            </a:r>
-            <a:r>
-              <a:rPr lang="de-DE">
-                <a:solidFill>
-                  <a:srgbClr val="19BBD5"/>
-                </a:solidFill>
-              </a:rPr>
-              <a:t>Cache </a:t>
-            </a:r>
-            <a:r>
-              <a:rPr lang="de-DE" smtClean="0">
-                <a:solidFill>
-                  <a:srgbClr val="19BBD5"/>
-                </a:solidFill>
-              </a:rPr>
-              <a:t>Basics</a:t>
-            </a:r>
-            <a:br>
-              <a:rPr lang="de-DE" smtClean="0">
-                <a:solidFill>
-                  <a:srgbClr val="19BBD5"/>
-                </a:solidFill>
-              </a:rPr>
-            </a:br>
-            <a:r>
-              <a:rPr lang="de-DE" smtClean="0">
-                <a:solidFill>
-                  <a:srgbClr val="19BBD5"/>
-                </a:solidFill>
-              </a:rPr>
-              <a:t> </a:t>
-            </a:r>
-            <a:r>
-              <a:rPr lang="de-DE" err="1"/>
+              <a:t> Cache Basics </a:t>
+            </a:r>
+            <a:r>
+              <a:rPr lang="de-DE" dirty="0" err="1"/>
               <a:t>bit.ly</a:t>
             </a:r>
             <a:r>
-              <a:rPr lang="de-DE"/>
+              <a:rPr lang="de-DE" dirty="0"/>
               <a:t>/</a:t>
             </a:r>
             <a:r>
-              <a:rPr lang="de-DE" err="1"/>
+              <a:rPr lang="de-DE" dirty="0" err="1"/>
               <a:t>cachetrail</a:t>
             </a:r>
-            <a:endParaRPr lang="de-DE" smtClean="0"/>
+            <a:endParaRPr lang="de-DE" dirty="0"/>
           </a:p>
           <a:p>
             <a:pPr marL="457200" lvl="0" indent="-304800">
@@ -28331,7 +28014,7 @@
               <a:buSzPct val="100000"/>
             </a:pPr>
             <a:r>
-              <a:rPr lang="de-DE" err="1" smtClean="0">
+              <a:rPr lang="de-DE" dirty="0" err="1">
                 <a:solidFill>
                   <a:srgbClr val="19BBD5"/>
                 </a:solidFill>
@@ -28339,30 +28022,15 @@
               <a:t>My</a:t>
             </a:r>
             <a:r>
-              <a:rPr lang="de-DE" smtClean="0">
+              <a:rPr lang="de-DE" dirty="0">
                 <a:solidFill>
                   <a:srgbClr val="19BBD5"/>
                 </a:solidFill>
               </a:rPr>
-              <a:t> Sample Code:</a:t>
-            </a:r>
-            <a:r>
-              <a:rPr lang="de-DE">
-                <a:solidFill>
-                  <a:srgbClr val="19BBD5"/>
-                </a:solidFill>
-              </a:rPr>
-              <a:t/>
-            </a:r>
-            <a:br>
-              <a:rPr lang="de-DE">
-                <a:solidFill>
-                  <a:srgbClr val="19BBD5"/>
-                </a:solidFill>
-              </a:rPr>
-            </a:br>
-            <a:r>
-              <a:rPr lang="de-DE" err="1" smtClean="0">
+              <a:t> Sample Code: </a:t>
+            </a:r>
+            <a:r>
+              <a:rPr lang="de-DE" dirty="0" err="1">
                 <a:solidFill>
                   <a:schemeClr val="bg1"/>
                 </a:solidFill>
@@ -28370,7 +28038,7 @@
               <a:t>github.com</a:t>
             </a:r>
             <a:r>
-              <a:rPr lang="de-DE" smtClean="0">
+              <a:rPr lang="de-DE" dirty="0">
                 <a:solidFill>
                   <a:schemeClr val="bg1"/>
                 </a:solidFill>
@@ -28378,7 +28046,7 @@
               <a:t>/</a:t>
             </a:r>
             <a:r>
-              <a:rPr lang="de-DE" err="1" smtClean="0">
+              <a:rPr lang="de-DE" dirty="0" err="1">
                 <a:solidFill>
                   <a:schemeClr val="bg1"/>
                 </a:solidFill>
@@ -28386,14 +28054,129 @@
               <a:t>dstdia</a:t>
             </a:r>
             <a:r>
-              <a:rPr lang="de-DE" smtClean="0">
+              <a:rPr lang="de-DE" dirty="0">
                 <a:solidFill>
                   <a:schemeClr val="bg1"/>
                 </a:solidFill>
               </a:rPr>
-              <a:t>/TahoeDreamin17/</a:t>
-            </a:r>
-            <a:endParaRPr lang="de-DE" smtClean="0">
+              <a:t>/</a:t>
+            </a:r>
+            <a:r>
+              <a:rPr lang="de-DE" dirty="0" err="1">
+                <a:solidFill>
+                  <a:schemeClr val="bg1"/>
+                </a:solidFill>
+              </a:rPr>
+              <a:t>PlatformCache</a:t>
+            </a:r>
+            <a:r>
+              <a:rPr lang="de-DE" dirty="0">
+                <a:solidFill>
+                  <a:schemeClr val="bg1"/>
+                </a:solidFill>
+              </a:rPr>
+              <a:t>/</a:t>
+            </a:r>
+          </a:p>
+          <a:p>
+            <a:pPr marL="457200" lvl="0" indent="-304800">
+              <a:lnSpc>
+                <a:spcPct val="150000"/>
+              </a:lnSpc>
+              <a:spcBef>
+                <a:spcPts val="0"/>
+              </a:spcBef>
+              <a:buSzPct val="100000"/>
+            </a:pPr>
+            <a:r>
+              <a:rPr lang="de-DE" dirty="0" err="1">
+                <a:solidFill>
+                  <a:srgbClr val="19BBD5"/>
+                </a:solidFill>
+              </a:rPr>
+              <a:t>Keir</a:t>
+            </a:r>
+            <a:r>
+              <a:rPr lang="de-DE" dirty="0">
+                <a:solidFill>
+                  <a:srgbClr val="19BBD5"/>
+                </a:solidFill>
+              </a:rPr>
+              <a:t> </a:t>
+            </a:r>
+            <a:r>
+              <a:rPr lang="de-DE" dirty="0" err="1">
+                <a:solidFill>
+                  <a:srgbClr val="19BBD5"/>
+                </a:solidFill>
+              </a:rPr>
+              <a:t>Bowden’s</a:t>
+            </a:r>
+            <a:r>
+              <a:rPr lang="de-DE" dirty="0">
+                <a:solidFill>
+                  <a:srgbClr val="19BBD5"/>
+                </a:solidFill>
+              </a:rPr>
+              <a:t> </a:t>
+            </a:r>
+            <a:r>
+              <a:rPr lang="de-DE" dirty="0" err="1">
+                <a:solidFill>
+                  <a:srgbClr val="19BBD5"/>
+                </a:solidFill>
+              </a:rPr>
+              <a:t>blog</a:t>
+            </a:r>
+            <a:r>
+              <a:rPr lang="de-DE" dirty="0">
+                <a:solidFill>
+                  <a:srgbClr val="19BBD5"/>
+                </a:solidFill>
+              </a:rPr>
+              <a:t> </a:t>
+            </a:r>
+            <a:r>
+              <a:rPr lang="de-DE" dirty="0" err="1">
+                <a:solidFill>
+                  <a:srgbClr val="19BBD5"/>
+                </a:solidFill>
+              </a:rPr>
+              <a:t>post</a:t>
+            </a:r>
+            <a:r>
+              <a:rPr lang="de-DE" dirty="0">
+                <a:solidFill>
+                  <a:srgbClr val="19BBD5"/>
+                </a:solidFill>
+              </a:rPr>
+              <a:t>: </a:t>
+            </a:r>
+            <a:r>
+              <a:rPr lang="de-DE" dirty="0" err="1">
+                <a:solidFill>
+                  <a:schemeClr val="bg1"/>
+                </a:solidFill>
+              </a:rPr>
+              <a:t>bit.ly</a:t>
+            </a:r>
+            <a:r>
+              <a:rPr lang="de-DE" dirty="0">
+                <a:solidFill>
+                  <a:schemeClr val="bg1"/>
+                </a:solidFill>
+              </a:rPr>
+              <a:t>/cache-</a:t>
+            </a:r>
+            <a:r>
+              <a:rPr lang="de-DE" dirty="0" err="1">
+                <a:solidFill>
+                  <a:schemeClr val="bg1"/>
+                </a:solidFill>
+              </a:rPr>
+              <a:t>buzzard</a:t>
+            </a:r>
+            <a:endParaRPr lang="de-DE" dirty="0">
               <a:solidFill>
                 <a:schemeClr val="bg1"/>
               </a:solidFill>
@@ -28410,15 +28193,23 @@
               <a:buSzPct val="100000"/>
             </a:pPr>
             <a:r>
-              <a:rPr lang="de-DE" err="1" smtClean="0">
+              <a:rPr lang="de-DE" dirty="0">
                 <a:solidFill>
                   <a:srgbClr val="19BBD5"/>
                 </a:solidFill>
               </a:rPr>
-              <a:t>Keir</a:t>
-            </a:r>
-            <a:r>
-              <a:rPr lang="de-DE" smtClean="0">
+              <a:t>Josh </a:t>
+            </a:r>
+            <a:r>
+              <a:rPr lang="de-DE" dirty="0" err="1">
+                <a:solidFill>
+                  <a:srgbClr val="19BBD5"/>
+                </a:solidFill>
+              </a:rPr>
+              <a:t>Kaplan‘s</a:t>
+            </a:r>
+            <a:r>
+              <a:rPr lang="de-DE" dirty="0">
                 <a:solidFill>
                   <a:srgbClr val="19BBD5"/>
                 </a:solidFill>
@@ -28426,15 +28217,15 @@
               <a:t> </a:t>
             </a:r>
             <a:r>
-              <a:rPr lang="de-DE" err="1" smtClean="0">
+              <a:rPr lang="de-DE" dirty="0" err="1">
                 <a:solidFill>
                   <a:srgbClr val="19BBD5"/>
                 </a:solidFill>
               </a:rPr>
-              <a:t>Bowden’s</a:t>
-            </a:r>
-            <a:r>
-              <a:rPr lang="de-DE" smtClean="0">
+              <a:t>blog</a:t>
+            </a:r>
+            <a:r>
+              <a:rPr lang="de-DE" dirty="0">
                 <a:solidFill>
                   <a:srgbClr val="19BBD5"/>
                 </a:solidFill>
@@ -28442,23 +28233,7 @@
               <a:t> </a:t>
             </a:r>
             <a:r>
-              <a:rPr lang="de-DE" err="1" smtClean="0">
-                <a:solidFill>
-                  <a:srgbClr val="19BBD5"/>
-                </a:solidFill>
-              </a:rPr>
-              <a:t>blog</a:t>
-            </a:r>
-            <a:r>
-              <a:rPr lang="de-DE" smtClean="0">
-                <a:solidFill>
-                  <a:srgbClr val="19BBD5"/>
-                </a:solidFill>
-              </a:rPr>
-              <a:t> </a:t>
-            </a:r>
-            <a:r>
-              <a:rPr lang="de-DE" err="1" smtClean="0">
+              <a:rPr lang="de-DE" dirty="0" err="1">
                 <a:solidFill>
                   <a:srgbClr val="19BBD5"/>
                 </a:solidFill>
@@ -28466,7 +28241,7 @@
               <a:t>post</a:t>
             </a:r>
             <a:r>
-              <a:rPr lang="de-DE">
+              <a:rPr lang="de-DE" dirty="0">
                 <a:solidFill>
                   <a:srgbClr val="19BBD5"/>
                 </a:solidFill>
@@ -28474,22 +28249,7 @@
               <a:t>: </a:t>
             </a:r>
             <a:r>
-              <a:rPr lang="de-DE" smtClean="0">
-                <a:solidFill>
-                  <a:srgbClr val="19BBD5"/>
-                </a:solidFill>
-              </a:rPr>
-              <a:t/>
-            </a:r>
-            <a:br>
-              <a:rPr lang="de-DE" smtClean="0">
-                <a:solidFill>
-                  <a:srgbClr val="19BBD5"/>
-                </a:solidFill>
-              </a:rPr>
-            </a:br>
-            <a:r>
-              <a:rPr lang="de-DE" err="1" smtClean="0">
+              <a:rPr lang="de-DE" dirty="0" err="1">
                 <a:solidFill>
                   <a:schemeClr val="bg1"/>
                 </a:solidFill>
@@ -28497,7 +28257,7 @@
               <a:t>bit.ly</a:t>
             </a:r>
             <a:r>
-              <a:rPr lang="de-DE" smtClean="0">
+              <a:rPr lang="de-DE" dirty="0">
                 <a:solidFill>
                   <a:schemeClr val="bg1"/>
                 </a:solidFill>
@@ -28505,14 +28265,14 @@
               <a:t>/cache-</a:t>
             </a:r>
             <a:r>
-              <a:rPr lang="de-DE" err="1" smtClean="0">
+              <a:rPr lang="de-DE" dirty="0" err="1">
                 <a:solidFill>
                   <a:schemeClr val="bg1"/>
                 </a:solidFill>
               </a:rPr>
-              <a:t>buzzard</a:t>
-            </a:r>
-            <a:endParaRPr lang="de-DE" smtClean="0">
+              <a:t>sfblog</a:t>
+            </a:r>
+            <a:endParaRPr lang="de-DE" dirty="0">
               <a:solidFill>
                 <a:schemeClr val="bg1"/>
               </a:solidFill>
@@ -28529,101 +28289,86 @@
               <a:buSzPct val="100000"/>
             </a:pPr>
             <a:r>
-              <a:rPr lang="de-DE" smtClean="0">
-                <a:solidFill>
-                  <a:srgbClr val="19BBD5"/>
-                </a:solidFill>
-              </a:rPr>
-              <a:t>Josh </a:t>
-            </a:r>
-            <a:r>
-              <a:rPr lang="de-DE" err="1" smtClean="0">
-                <a:solidFill>
-                  <a:srgbClr val="19BBD5"/>
-                </a:solidFill>
-              </a:rPr>
-              <a:t>Kaplan‘s</a:t>
-            </a:r>
-            <a:r>
-              <a:rPr lang="de-DE" smtClean="0">
-                <a:solidFill>
-                  <a:srgbClr val="19BBD5"/>
-                </a:solidFill>
-              </a:rPr>
-              <a:t> </a:t>
-            </a:r>
-            <a:r>
-              <a:rPr lang="de-DE" err="1" smtClean="0">
-                <a:solidFill>
-                  <a:srgbClr val="19BBD5"/>
-                </a:solidFill>
-              </a:rPr>
-              <a:t>blog</a:t>
-            </a:r>
-            <a:r>
-              <a:rPr lang="de-DE">
-                <a:solidFill>
-                  <a:srgbClr val="19BBD5"/>
-                </a:solidFill>
-              </a:rPr>
-              <a:t> </a:t>
-            </a:r>
-            <a:r>
-              <a:rPr lang="de-DE" err="1">
-                <a:solidFill>
-                  <a:srgbClr val="19BBD5"/>
-                </a:solidFill>
-              </a:rPr>
-              <a:t>post</a:t>
-            </a:r>
-            <a:r>
-              <a:rPr lang="de-DE">
-                <a:solidFill>
-                  <a:srgbClr val="19BBD5"/>
-                </a:solidFill>
-              </a:rPr>
-              <a:t>: </a:t>
-            </a:r>
-            <a:r>
-              <a:rPr lang="de-DE" smtClean="0">
-                <a:solidFill>
-                  <a:srgbClr val="19BBD5"/>
-                </a:solidFill>
-              </a:rPr>
-              <a:t/>
-            </a:r>
-            <a:br>
-              <a:rPr lang="de-DE" smtClean="0">
-                <a:solidFill>
-                  <a:srgbClr val="19BBD5"/>
-                </a:solidFill>
-              </a:rPr>
-            </a:br>
-            <a:r>
-              <a:rPr lang="de-DE" err="1" smtClean="0">
+              <a:rPr lang="de-DE" dirty="0">
                 <a:solidFill>
                   <a:schemeClr val="bg1"/>
                 </a:solidFill>
               </a:rPr>
-              <a:t>bit.ly</a:t>
-            </a:r>
-            <a:r>
-              <a:rPr lang="de-DE" smtClean="0">
+              <a:t>Amit </a:t>
+            </a:r>
+            <a:r>
+              <a:rPr lang="de-DE" dirty="0" err="1">
                 <a:solidFill>
                   <a:schemeClr val="bg1"/>
                 </a:solidFill>
               </a:rPr>
-              <a:t>/cache-</a:t>
-            </a:r>
-            <a:r>
-              <a:rPr lang="de-DE" err="1" smtClean="0">
+              <a:t>Chaudhary</a:t>
+            </a:r>
+            <a:r>
+              <a:rPr lang="de-DE" dirty="0">
                 <a:solidFill>
                   <a:schemeClr val="bg1"/>
                 </a:solidFill>
               </a:rPr>
-              <a:t>sfblog</a:t>
-            </a:r>
-            <a:endParaRPr lang="de-DE" smtClean="0">
+              <a:t>: http://</a:t>
+            </a:r>
+            <a:r>
+              <a:rPr lang="de-DE" dirty="0" err="1">
+                <a:solidFill>
+                  <a:schemeClr val="bg1"/>
+                </a:solidFill>
+              </a:rPr>
+              <a:t>amitsalesforce.blogspot.com</a:t>
+            </a:r>
+            <a:r>
+              <a:rPr lang="de-DE" dirty="0">
+                <a:solidFill>
+                  <a:schemeClr val="bg1"/>
+                </a:solidFill>
+              </a:rPr>
+              <a:t>/2018/11/</a:t>
+            </a:r>
+            <a:r>
+              <a:rPr lang="de-DE" dirty="0" err="1">
+                <a:solidFill>
+                  <a:schemeClr val="bg1"/>
+                </a:solidFill>
+              </a:rPr>
+              <a:t>platform</a:t>
+            </a:r>
+            <a:r>
+              <a:rPr lang="de-DE" dirty="0">
+                <a:solidFill>
+                  <a:schemeClr val="bg1"/>
+                </a:solidFill>
+              </a:rPr>
+              <a:t>-cache-in-</a:t>
+            </a:r>
+            <a:r>
+              <a:rPr lang="de-DE" dirty="0" err="1">
+                <a:solidFill>
+                  <a:schemeClr val="bg1"/>
+                </a:solidFill>
+              </a:rPr>
+              <a:t>salesforce</a:t>
+            </a:r>
+            <a:r>
+              <a:rPr lang="de-DE" dirty="0">
+                <a:solidFill>
+                  <a:schemeClr val="bg1"/>
+                </a:solidFill>
+              </a:rPr>
+              <a:t>-</a:t>
+            </a:r>
+            <a:r>
+              <a:rPr lang="de-DE" dirty="0" err="1">
+                <a:solidFill>
+                  <a:schemeClr val="bg1"/>
+                </a:solidFill>
+              </a:rPr>
+              <a:t>platform.html</a:t>
+            </a:r>
+            <a:endParaRPr lang="de-DE" dirty="0">
               <a:solidFill>
                 <a:schemeClr val="bg1"/>
               </a:solidFill>
@@ -28636,13 +28381,6 @@
   <p:clrMapOvr>
     <a:masterClrMapping/>
   </p:clrMapOvr>
-  <p:timing>
-    <p:tnLst>
-      <p:par>
-        <p:cTn id="1" dur="indefinite" restart="never" nodeType="tmRoot"/>
-      </p:par>
-    </p:tnLst>
-  </p:timing>
 </p:sld>
 </file>
 
@@ -28761,15 +28499,15 @@
               </a:spcBef>
             </a:pPr>
             <a:r>
-              <a:rPr lang="en" dirty="0" smtClean="0"/>
+              <a:rPr lang="en" dirty="0"/>
               <a:t>@</a:t>
             </a:r>
             <a:r>
-              <a:rPr lang="de-DE" dirty="0" err="1" smtClean="0"/>
+              <a:rPr lang="de-DE" dirty="0" err="1"/>
               <a:t>stangomat</a:t>
             </a:r>
             <a:r>
-              <a:rPr lang="de-DE" dirty="0" smtClean="0"/>
+              <a:rPr lang="de-DE" dirty="0"/>
               <a:t>	</a:t>
             </a:r>
             <a:endParaRPr lang="en" dirty="0"/>
@@ -28781,14 +28519,14 @@
               </a:spcBef>
             </a:pPr>
             <a:r>
-              <a:rPr lang="en" dirty="0" smtClean="0"/>
+              <a:rPr lang="en" dirty="0"/>
               <a:t>D</a:t>
             </a:r>
             <a:r>
-              <a:rPr lang="de-DE" dirty="0" err="1" smtClean="0"/>
+              <a:rPr lang="de-DE" dirty="0" err="1"/>
               <a:t>aniel.stange@die.interaktiven.de</a:t>
             </a:r>
-            <a:endParaRPr lang="de-DE" dirty="0" smtClean="0"/>
+            <a:endParaRPr lang="de-DE" dirty="0"/>
           </a:p>
           <a:p>
             <a:pPr marL="457200" lvl="0" indent="-228600" rtl="0">
@@ -28797,15 +28535,15 @@
               </a:spcBef>
             </a:pPr>
             <a:r>
-              <a:rPr lang="de-DE" dirty="0" err="1" smtClean="0"/>
+              <a:rPr lang="de-DE" dirty="0" err="1"/>
               <a:t>Github.com</a:t>
             </a:r>
             <a:r>
-              <a:rPr lang="de-DE" dirty="0" smtClean="0"/>
+              <a:rPr lang="de-DE" dirty="0"/>
               <a:t>/</a:t>
             </a:r>
             <a:r>
-              <a:rPr lang="de-DE" dirty="0" err="1" smtClean="0"/>
+              <a:rPr lang="de-DE" dirty="0" err="1"/>
               <a:t>dstdia</a:t>
             </a:r>
             <a:endParaRPr lang="en" dirty="0"/>
@@ -32507,13 +32245,6 @@
   <p:clrMapOvr>
     <a:masterClrMapping/>
   </p:clrMapOvr>
-  <p:timing>
-    <p:tnLst>
-      <p:par>
-        <p:cTn id="1" dur="indefinite" restart="never" nodeType="tmRoot"/>
-      </p:par>
-    </p:tnLst>
-  </p:timing>
 </p:sld>
 </file>
 
@@ -32566,11 +32297,11 @@
               <a:buNone/>
             </a:pPr>
             <a:r>
-              <a:rPr lang="de-DE" smtClean="0"/>
+              <a:rPr lang="de-DE"/>
               <a:t>Key </a:t>
             </a:r>
             <a:r>
-              <a:rPr lang="de-DE" err="1" smtClean="0"/>
+              <a:rPr lang="de-DE" err="1"/>
               <a:t>Takeaways</a:t>
             </a:r>
             <a:endParaRPr lang="en"/>
@@ -32611,7 +32342,7 @@
               </a:spcBef>
             </a:pPr>
             <a:r>
-              <a:rPr lang="en-US" smtClean="0"/>
+              <a:rPr lang="en-US"/>
               <a:t>Learn using the platform cache can boost your app‘s performance significantly</a:t>
             </a:r>
           </a:p>
@@ -32625,7 +32356,7 @@
               </a:spcBef>
             </a:pPr>
             <a:r>
-              <a:rPr lang="en-US" smtClean="0"/>
+              <a:rPr lang="en-US"/>
               <a:t>Understand which kind of data to put in the cache </a:t>
             </a:r>
           </a:p>
@@ -32639,7 +32370,7 @@
               </a:spcBef>
             </a:pPr>
             <a:r>
-              <a:rPr lang="en-US" smtClean="0"/>
+              <a:rPr lang="en-US"/>
               <a:t>Know the obstacles when you use to the platform cache and prepare for cache misses and unexpected results</a:t>
             </a:r>
           </a:p>
@@ -32655,13 +32386,6 @@
   <p:clrMapOvr>
     <a:masterClrMapping/>
   </p:clrMapOvr>
-  <p:timing>
-    <p:tnLst>
-      <p:par>
-        <p:cTn id="1" dur="indefinite" restart="never" nodeType="tmRoot"/>
-      </p:par>
-    </p:tnLst>
-  </p:timing>
 </p:sld>
 </file>
 
@@ -32714,11 +32438,11 @@
               <a:buNone/>
             </a:pPr>
             <a:r>
-              <a:rPr lang="de-DE" dirty="0" err="1" smtClean="0"/>
+              <a:rPr lang="de-DE" dirty="0" err="1"/>
               <a:t>Platform</a:t>
             </a:r>
             <a:r>
-              <a:rPr lang="de-DE" smtClean="0"/>
+              <a:rPr lang="de-DE"/>
               <a:t> Cache</a:t>
             </a:r>
             <a:endParaRPr lang="en"/>
@@ -32759,7 +32483,7 @@
               </a:spcBef>
             </a:pPr>
             <a:r>
-              <a:rPr lang="en-US" smtClean="0"/>
+              <a:rPr lang="en-US"/>
               <a:t>GA since Winter 16</a:t>
             </a:r>
           </a:p>
@@ -32773,7 +32497,7 @@
               </a:spcBef>
             </a:pPr>
             <a:r>
-              <a:rPr lang="en-US" smtClean="0"/>
+              <a:rPr lang="en-US"/>
               <a:t>Simple Key-Value-Approach (Map&lt;String, Object&gt;)</a:t>
             </a:r>
           </a:p>
@@ -32787,7 +32511,7 @@
               </a:spcBef>
             </a:pPr>
             <a:r>
-              <a:rPr lang="en-US" smtClean="0"/>
+              <a:rPr lang="en-US"/>
               <a:t>Easy to implement ANY cache strategy</a:t>
             </a:r>
           </a:p>
@@ -32801,10 +32525,9 @@
               </a:spcBef>
             </a:pPr>
             <a:r>
-              <a:rPr lang="en-US" smtClean="0"/>
+              <a:rPr lang="en-US"/>
               <a:t>Not so easy to design a GOOD, sustainable strategy</a:t>
             </a:r>
-            <a:endParaRPr lang="en-US"/>
           </a:p>
         </p:txBody>
       </p:sp>
@@ -32818,13 +32541,6 @@
   <p:clrMapOvr>
     <a:masterClrMapping/>
   </p:clrMapOvr>
-  <p:timing>
-    <p:tnLst>
-      <p:par>
-        <p:cTn id="1" dur="indefinite" restart="never" nodeType="tmRoot"/>
-      </p:par>
-    </p:tnLst>
-  </p:timing>
 </p:sld>
 </file>
 
@@ -32877,11 +32593,11 @@
               <a:buNone/>
             </a:pPr>
             <a:r>
-              <a:rPr lang="de-DE" smtClean="0"/>
+              <a:rPr lang="de-DE"/>
               <a:t>Cache </a:t>
             </a:r>
             <a:r>
-              <a:rPr lang="de-DE" err="1" smtClean="0"/>
+              <a:rPr lang="de-DE" err="1"/>
               <a:t>Types</a:t>
             </a:r>
             <a:endParaRPr lang="en"/>
@@ -32929,7 +32645,7 @@
           <a:p>
             <a:pPr lvl="0" algn="ctr"/>
             <a:r>
-              <a:rPr lang="de-DE" smtClean="0">
+              <a:rPr lang="de-DE">
                 <a:solidFill>
                   <a:srgbClr val="C6DAEC"/>
                 </a:solidFill>
@@ -32941,7 +32657,7 @@
               <a:t>ORG</a:t>
             </a:r>
             <a:br>
-              <a:rPr lang="de-DE" smtClean="0">
+              <a:rPr lang="de-DE">
                 <a:solidFill>
                   <a:srgbClr val="C6DAEC"/>
                 </a:solidFill>
@@ -32952,7 +32668,7 @@
               </a:rPr>
             </a:br>
             <a:r>
-              <a:rPr lang="de-DE" err="1" smtClean="0">
+              <a:rPr lang="de-DE" err="1">
                 <a:solidFill>
                   <a:srgbClr val="C6DAEC"/>
                 </a:solidFill>
@@ -32964,7 +32680,7 @@
               <a:t>one</a:t>
             </a:r>
             <a:r>
-              <a:rPr lang="de-DE" smtClean="0">
+              <a:rPr lang="de-DE">
                 <a:solidFill>
                   <a:srgbClr val="C6DAEC"/>
                 </a:solidFill>
@@ -32976,7 +32692,7 @@
               <a:t> </a:t>
             </a:r>
             <a:r>
-              <a:rPr lang="de-DE" err="1" smtClean="0">
+              <a:rPr lang="de-DE" err="1">
                 <a:solidFill>
                   <a:srgbClr val="C6DAEC"/>
                 </a:solidFill>
@@ -32988,7 +32704,7 @@
               <a:t>cache</a:t>
             </a:r>
             <a:r>
-              <a:rPr lang="de-DE" smtClean="0">
+              <a:rPr lang="de-DE">
                 <a:solidFill>
                   <a:srgbClr val="C6DAEC"/>
                 </a:solidFill>
@@ -33000,7 +32716,7 @@
               <a:t> </a:t>
             </a:r>
             <a:r>
-              <a:rPr lang="de-DE" err="1" smtClean="0">
+              <a:rPr lang="de-DE" err="1">
                 <a:solidFill>
                   <a:srgbClr val="C6DAEC"/>
                 </a:solidFill>
@@ -33012,7 +32728,31 @@
               <a:t>for</a:t>
             </a:r>
             <a:r>
-              <a:rPr lang="de-DE" smtClean="0">
+              <a:rPr lang="de-DE">
+                <a:solidFill>
+                  <a:srgbClr val="C6DAEC"/>
+                </a:solidFill>
+                <a:latin typeface="Muli"/>
+                <a:ea typeface="Muli"/>
+                <a:cs typeface="Muli"/>
+                <a:sym typeface="Muli"/>
+              </a:rPr>
+              <a:t> all </a:t>
+            </a:r>
+            <a:r>
+              <a:rPr lang="de-DE" err="1">
+                <a:solidFill>
+                  <a:srgbClr val="C6DAEC"/>
+                </a:solidFill>
+                <a:latin typeface="Muli"/>
+                <a:ea typeface="Muli"/>
+                <a:cs typeface="Muli"/>
+                <a:sym typeface="Muli"/>
+              </a:rPr>
+              <a:t>users</a:t>
+            </a:r>
+            <a:r>
+              <a:rPr lang="de-DE">
                 <a:solidFill>
                   <a:srgbClr val="C6DAEC"/>
                 </a:solidFill>
@@ -33024,43 +32764,7 @@
               <a:t> </a:t>
             </a:r>
             <a:r>
-              <a:rPr lang="de-DE">
-                <a:solidFill>
-                  <a:srgbClr val="C6DAEC"/>
-                </a:solidFill>
-                <a:latin typeface="Muli"/>
-                <a:ea typeface="Muli"/>
-                <a:cs typeface="Muli"/>
-                <a:sym typeface="Muli"/>
-              </a:rPr>
-              <a:t>all </a:t>
-            </a:r>
-            <a:r>
-              <a:rPr lang="de-DE" err="1" smtClean="0">
-                <a:solidFill>
-                  <a:srgbClr val="C6DAEC"/>
-                </a:solidFill>
-                <a:latin typeface="Muli"/>
-                <a:ea typeface="Muli"/>
-                <a:cs typeface="Muli"/>
-                <a:sym typeface="Muli"/>
-              </a:rPr>
-              <a:t>users</a:t>
-            </a:r>
-            <a:r>
-              <a:rPr lang="de-DE" smtClean="0">
-                <a:solidFill>
-                  <a:srgbClr val="C6DAEC"/>
-                </a:solidFill>
-                <a:latin typeface="Muli"/>
-                <a:ea typeface="Muli"/>
-                <a:cs typeface="Muli"/>
-                <a:sym typeface="Muli"/>
-              </a:rPr>
-              <a:t> </a:t>
-            </a:r>
-            <a:r>
-              <a:rPr lang="de-DE" err="1" smtClean="0">
+              <a:rPr lang="de-DE" err="1">
                 <a:solidFill>
                   <a:srgbClr val="C6DAEC"/>
                 </a:solidFill>
@@ -33072,7 +32776,7 @@
               <a:t>and</a:t>
             </a:r>
             <a:r>
-              <a:rPr lang="de-DE" smtClean="0">
+              <a:rPr lang="de-DE">
                 <a:solidFill>
                   <a:srgbClr val="C6DAEC"/>
                 </a:solidFill>
@@ -33107,15 +32811,6 @@
               </a:rPr>
               <a:t> </a:t>
             </a:r>
-            <a:endParaRPr lang="de-DE" smtClean="0">
-              <a:solidFill>
-                <a:srgbClr val="C6DAEC"/>
-              </a:solidFill>
-              <a:latin typeface="Muli"/>
-              <a:ea typeface="Muli"/>
-              <a:cs typeface="Muli"/>
-              <a:sym typeface="Muli"/>
-            </a:endParaRPr>
           </a:p>
           <a:p>
             <a:pPr lvl="0" algn="ctr"/>
@@ -33129,22 +32824,10 @@
                 <a:cs typeface="Muli"/>
                 <a:sym typeface="Muli"/>
               </a:rPr>
-              <a:t>l</a:t>
-            </a:r>
-            <a:r>
-              <a:rPr lang="de-DE" err="1" smtClean="0">
-                <a:solidFill>
-                  <a:srgbClr val="C6DAEC"/>
-                </a:solidFill>
-                <a:latin typeface="Muli"/>
-                <a:ea typeface="Muli"/>
-                <a:cs typeface="Muli"/>
-                <a:sym typeface="Muli"/>
-              </a:rPr>
-              <a:t>onger</a:t>
-            </a:r>
-            <a:r>
-              <a:rPr lang="de-DE" smtClean="0">
+              <a:t>longer</a:t>
+            </a:r>
+            <a:r>
+              <a:rPr lang="de-DE">
                 <a:solidFill>
                   <a:srgbClr val="C6DAEC"/>
                 </a:solidFill>
@@ -33163,7 +32846,7 @@
               </a:spcBef>
               <a:buNone/>
             </a:pPr>
-            <a:endParaRPr lang="de-DE" smtClean="0">
+            <a:endParaRPr lang="de-DE">
               <a:solidFill>
                 <a:srgbClr val="C6DAEC"/>
               </a:solidFill>
@@ -33216,7 +32899,7 @@
               <a:buNone/>
             </a:pPr>
             <a:r>
-              <a:rPr lang="de-DE" smtClean="0">
+              <a:rPr lang="de-DE">
                 <a:solidFill>
                   <a:srgbClr val="C6DAEC"/>
                 </a:solidFill>
@@ -33245,22 +32928,10 @@
                 <a:cs typeface="Muli"/>
                 <a:sym typeface="Muli"/>
               </a:rPr>
-              <a:t>s</a:t>
-            </a:r>
-            <a:r>
-              <a:rPr lang="de-DE" err="1" smtClean="0">
-                <a:solidFill>
-                  <a:srgbClr val="C6DAEC"/>
-                </a:solidFill>
-                <a:latin typeface="Muli"/>
-                <a:ea typeface="Muli"/>
-                <a:cs typeface="Muli"/>
-                <a:sym typeface="Muli"/>
-              </a:rPr>
-              <a:t>coped</a:t>
-            </a:r>
-            <a:r>
-              <a:rPr lang="de-DE" smtClean="0">
+              <a:t>scoped</a:t>
+            </a:r>
+            <a:r>
+              <a:rPr lang="de-DE">
                 <a:solidFill>
                   <a:srgbClr val="C6DAEC"/>
                 </a:solidFill>
@@ -33280,7 +32951,7 @@
               <a:buNone/>
             </a:pPr>
             <a:r>
-              <a:rPr lang="de-DE" smtClean="0">
+              <a:rPr lang="de-DE">
                 <a:solidFill>
                   <a:srgbClr val="C6DAEC"/>
                 </a:solidFill>
@@ -33292,7 +32963,7 @@
               <a:t>TTL = Session </a:t>
             </a:r>
             <a:r>
-              <a:rPr lang="de-DE" err="1" smtClean="0">
+              <a:rPr lang="de-DE" err="1">
                 <a:solidFill>
                   <a:srgbClr val="C6DAEC"/>
                 </a:solidFill>
@@ -33325,13 +32996,6 @@
   <p:clrMapOvr>
     <a:masterClrMapping/>
   </p:clrMapOvr>
-  <p:timing>
-    <p:tnLst>
-      <p:par>
-        <p:cTn id="1" dur="indefinite" restart="never" nodeType="tmRoot"/>
-      </p:par>
-    </p:tnLst>
-  </p:timing>
 </p:sld>
 </file>
 
@@ -33384,11 +33048,11 @@
               <a:buNone/>
             </a:pPr>
             <a:r>
-              <a:rPr lang="de-DE" smtClean="0"/>
+              <a:rPr lang="de-DE"/>
               <a:t>First </a:t>
             </a:r>
             <a:r>
-              <a:rPr lang="de-DE" err="1" smtClean="0"/>
+              <a:rPr lang="de-DE" err="1"/>
               <a:t>Steps</a:t>
             </a:r>
             <a:endParaRPr lang="en"/>
@@ -33429,22 +33093,14 @@
               </a:spcBef>
             </a:pPr>
             <a:r>
-              <a:rPr lang="en-US" smtClean="0"/>
-              <a:t>Create a cache </a:t>
-            </a:r>
-            <a:r>
               <a:rPr lang="en-US"/>
-              <a:t>p</a:t>
-            </a:r>
-            <a:r>
-              <a:rPr lang="en-US" smtClean="0"/>
-              <a:t>artition </a:t>
+              <a:t>Create a cache partition </a:t>
             </a:r>
             <a:br>
-              <a:rPr lang="en-US" smtClean="0"/>
+              <a:rPr lang="en-US"/>
             </a:br>
             <a:r>
-              <a:rPr lang="en-US" smtClean="0"/>
+              <a:rPr lang="en-US"/>
               <a:t>(request a trial, if you‘re using a DE)</a:t>
             </a:r>
           </a:p>
@@ -33460,13 +33116,6 @@
   <p:clrMapOvr>
     <a:masterClrMapping/>
   </p:clrMapOvr>
-  <p:timing>
-    <p:tnLst>
-      <p:par>
-        <p:cTn id="1" dur="indefinite" restart="never" nodeType="tmRoot"/>
-      </p:par>
-    </p:tnLst>
-  </p:timing>
 </p:sld>
 </file>
 
@@ -34005,7 +33654,7 @@
               <a:buNone/>
             </a:pPr>
             <a:r>
-              <a:rPr lang="de-DE" b="1" err="1" smtClean="0">
+              <a:rPr lang="de-DE" b="1" err="1">
                 <a:solidFill>
                   <a:srgbClr val="19BBD5"/>
                 </a:solidFill>
@@ -34013,7 +33662,7 @@
               <a:t>Develop</a:t>
             </a:r>
             <a:r>
-              <a:rPr lang="de-DE" b="1" smtClean="0">
+              <a:rPr lang="de-DE" b="1">
                 <a:solidFill>
                   <a:srgbClr val="19BBD5"/>
                 </a:solidFill>
@@ -34021,7 +33670,7 @@
               <a:t> -&gt; </a:t>
             </a:r>
             <a:r>
-              <a:rPr lang="de-DE" b="1" err="1" smtClean="0">
+              <a:rPr lang="de-DE" b="1" err="1">
                 <a:solidFill>
                   <a:srgbClr val="19BBD5"/>
                 </a:solidFill>
@@ -34029,7 +33678,7 @@
               <a:t>Platform</a:t>
             </a:r>
             <a:r>
-              <a:rPr lang="de-DE" b="1" smtClean="0">
+              <a:rPr lang="de-DE" b="1">
                 <a:solidFill>
                   <a:srgbClr val="19BBD5"/>
                 </a:solidFill>
@@ -34045,11 +33694,7 @@
             </a:pPr>
             <a:r>
               <a:rPr lang="en-US" sz="1800"/>
-              <a:t>Distribute </a:t>
-            </a:r>
-            <a:r>
-              <a:rPr lang="en-US" sz="1800" smtClean="0"/>
-              <a:t>some storage. </a:t>
+              <a:t>Distribute some storage. </a:t>
             </a:r>
           </a:p>
           <a:p>
@@ -34059,18 +33704,9 @@
               </a:spcBef>
             </a:pPr>
             <a:r>
-              <a:rPr lang="en-US" sz="1800" smtClean="0"/>
-              <a:t>Cache </a:t>
-            </a:r>
-            <a:r>
               <a:rPr lang="en-US" sz="1800"/>
-              <a:t>partitions can be 0 or 5 to 10 MB in </a:t>
-            </a:r>
-            <a:r>
-              <a:rPr lang="en-US" sz="1800" smtClean="0"/>
-              <a:t>size</a:t>
-            </a:r>
-            <a:endParaRPr lang="en-US" sz="1800"/>
+              <a:t>Cache partitions can be 0 or 5 to 10 MB in size</a:t>
+            </a:r>
           </a:p>
         </p:txBody>
       </p:sp>
@@ -34389,13 +34025,6 @@
   <p:clrMapOvr>
     <a:masterClrMapping/>
   </p:clrMapOvr>
-  <p:timing>
-    <p:tnLst>
-      <p:par>
-        <p:cTn id="1" dur="indefinite" restart="never" nodeType="tmRoot"/>
-      </p:par>
-    </p:tnLst>
-  </p:timing>
 </p:sld>
 </file>
 
@@ -35479,7 +35108,7 @@
               <a:buNone/>
             </a:pPr>
             <a:r>
-              <a:rPr lang="de-DE" b="1" err="1" smtClean="0">
+              <a:rPr lang="de-DE" b="1" err="1">
                 <a:solidFill>
                   <a:srgbClr val="19BBD5"/>
                 </a:solidFill>
@@ -35487,7 +35116,7 @@
               <a:t>Develop</a:t>
             </a:r>
             <a:r>
-              <a:rPr lang="de-DE" b="1" smtClean="0">
+              <a:rPr lang="de-DE" b="1">
                 <a:solidFill>
                   <a:srgbClr val="19BBD5"/>
                 </a:solidFill>
@@ -35495,7 +35124,7 @@
               <a:t> -&gt; </a:t>
             </a:r>
             <a:r>
-              <a:rPr lang="de-DE" b="1" err="1" smtClean="0">
+              <a:rPr lang="de-DE" b="1" err="1">
                 <a:solidFill>
                   <a:srgbClr val="19BBD5"/>
                 </a:solidFill>
@@ -35503,7 +35132,7 @@
               <a:t>Platform</a:t>
             </a:r>
             <a:r>
-              <a:rPr lang="de-DE" b="1" smtClean="0">
+              <a:rPr lang="de-DE" b="1">
                 <a:solidFill>
                   <a:srgbClr val="19BBD5"/>
                 </a:solidFill>
@@ -35520,19 +35149,19 @@
               <a:buNone/>
             </a:pPr>
             <a:r>
-              <a:rPr lang="de-DE" sz="1800" smtClean="0"/>
+              <a:rPr lang="de-DE" sz="1800"/>
               <a:t>Review </a:t>
             </a:r>
             <a:r>
-              <a:rPr lang="de-DE" sz="1800" err="1" smtClean="0"/>
+              <a:rPr lang="de-DE" sz="1800" err="1"/>
               <a:t>your</a:t>
             </a:r>
             <a:r>
-              <a:rPr lang="de-DE" sz="1800" smtClean="0"/>
+              <a:rPr lang="de-DE" sz="1800"/>
               <a:t> </a:t>
             </a:r>
             <a:r>
-              <a:rPr lang="de-DE" sz="1800" err="1" smtClean="0"/>
+              <a:rPr lang="de-DE" sz="1800" err="1"/>
               <a:t>partitions</a:t>
             </a:r>
             <a:endParaRPr lang="en" sz="1800"/>
@@ -35544,13 +35173,6 @@
   <p:clrMapOvr>
     <a:masterClrMapping/>
   </p:clrMapOvr>
-  <p:timing>
-    <p:tnLst>
-      <p:par>
-        <p:cTn id="1" dur="indefinite" restart="never" nodeType="tmRoot"/>
-      </p:par>
-    </p:tnLst>
-  </p:timing>
 </p:sld>
 </file>
 
@@ -36634,7 +36256,7 @@
               <a:buNone/>
             </a:pPr>
             <a:r>
-              <a:rPr lang="de-DE" b="1" smtClean="0">
+              <a:rPr lang="de-DE" b="1">
                 <a:solidFill>
                   <a:srgbClr val="19BBD5"/>
                 </a:solidFill>
@@ -36642,14 +36264,14 @@
               <a:t>Developer </a:t>
             </a:r>
             <a:r>
-              <a:rPr lang="de-DE" b="1" err="1" smtClean="0">
+              <a:rPr lang="de-DE" b="1" err="1">
                 <a:solidFill>
                   <a:srgbClr val="19BBD5"/>
                 </a:solidFill>
               </a:rPr>
               <a:t>Workbench</a:t>
             </a:r>
-            <a:endParaRPr lang="de-DE" b="1" smtClean="0">
+            <a:endParaRPr lang="de-DE" b="1">
               <a:solidFill>
                 <a:srgbClr val="19BBD5"/>
               </a:solidFill>
@@ -36666,19 +36288,7 @@
             </a:pPr>
             <a:r>
               <a:rPr lang="en-US" sz="1800"/>
-              <a:t>Put in </a:t>
-            </a:r>
-            <a:r>
-              <a:rPr lang="en-US" sz="1800" smtClean="0"/>
-              <a:t>some data: </a:t>
-            </a:r>
-            <a:r>
-              <a:rPr lang="en-US" smtClean="0">
-                <a:latin typeface="Menlo" charset="0"/>
-                <a:ea typeface="Menlo" charset="0"/>
-                <a:cs typeface="Menlo" charset="0"/>
-              </a:rPr>
-              <a:t>Cache</a:t>
+              <a:t>Put in some data: </a:t>
             </a:r>
             <a:r>
               <a:rPr lang="en-US">
@@ -36686,25 +36296,17 @@
                 <a:ea typeface="Menlo" charset="0"/>
                 <a:cs typeface="Menlo" charset="0"/>
               </a:rPr>
-              <a:t>.[</a:t>
-            </a:r>
-            <a:r>
-              <a:rPr lang="en-US" smtClean="0">
-                <a:latin typeface="Menlo" charset="0"/>
-                <a:ea typeface="Menlo" charset="0"/>
-                <a:cs typeface="Menlo" charset="0"/>
-              </a:rPr>
-              <a:t>Org/Session].put(Namespace.</a:t>
+              <a:t>Cache.[Org/Session].put(Namespace.</a:t>
             </a:r>
             <a:br>
-              <a:rPr lang="en-US" smtClean="0">
+              <a:rPr lang="en-US">
                 <a:latin typeface="Menlo" charset="0"/>
                 <a:ea typeface="Menlo" charset="0"/>
                 <a:cs typeface="Menlo" charset="0"/>
               </a:rPr>
             </a:br>
             <a:r>
-              <a:rPr lang="en-US" err="1" smtClean="0">
+              <a:rPr lang="en-US" err="1">
                 <a:latin typeface="Menlo" charset="0"/>
                 <a:ea typeface="Menlo" charset="0"/>
                 <a:cs typeface="Menlo" charset="0"/>
@@ -36712,26 +36314,13 @@
               <a:t>PartionName.Key</a:t>
             </a:r>
             <a:r>
-              <a:rPr lang="en-US" smtClean="0">
-                <a:latin typeface="Menlo" charset="0"/>
-                <a:ea typeface="Menlo" charset="0"/>
-                <a:cs typeface="Menlo" charset="0"/>
-              </a:rPr>
-              <a:t>, </a:t>
-            </a:r>
-            <a:r>
               <a:rPr lang="en-US">
                 <a:latin typeface="Menlo" charset="0"/>
                 <a:ea typeface="Menlo" charset="0"/>
                 <a:cs typeface="Menlo" charset="0"/>
               </a:rPr>
-              <a:t>Object)</a:t>
-            </a:r>
-            <a:endParaRPr lang="en-US">
-              <a:latin typeface="Menlo" charset="0"/>
-              <a:ea typeface="Menlo" charset="0"/>
-              <a:cs typeface="Menlo" charset="0"/>
-            </a:endParaRPr>
+              <a:t>, Object)</a:t>
+            </a:r>
           </a:p>
         </p:txBody>
       </p:sp>
@@ -36745,13 +36334,6 @@
   <p:clrMapOvr>
     <a:masterClrMapping/>
   </p:clrMapOvr>
-  <p:timing>
-    <p:tnLst>
-      <p:par>
-        <p:cTn id="1" dur="indefinite" restart="never" nodeType="tmRoot"/>
-      </p:par>
-    </p:tnLst>
-  </p:timing>
 </p:sld>
 </file>
 

</xml_diff>